<commit_message>
Completed model analysis in R
</commit_message>
<xml_diff>
--- a/Effects of Pedestrians on Traffic Flow of Cars.pptx
+++ b/Effects of Pedestrians on Traffic Flow of Cars.pptx
@@ -12,10 +12,11 @@
     <p:sldId id="262" r:id="rId6"/>
     <p:sldId id="263" r:id="rId7"/>
     <p:sldId id="260" r:id="rId8"/>
-    <p:sldId id="265" r:id="rId9"/>
-    <p:sldId id="261" r:id="rId10"/>
-    <p:sldId id="264" r:id="rId11"/>
-    <p:sldId id="266" r:id="rId12"/>
+    <p:sldId id="267" r:id="rId9"/>
+    <p:sldId id="265" r:id="rId10"/>
+    <p:sldId id="261" r:id="rId11"/>
+    <p:sldId id="264" r:id="rId12"/>
+    <p:sldId id="266" r:id="rId13"/>
   </p:sldIdLst>
   <p:sldSz cx="12192000" cy="6858000"/>
   <p:notesSz cx="6858000" cy="9144000"/>
@@ -114,7 +115,440 @@
       </a:defRPr>
     </a:lvl9pPr>
   </p:defaultTextStyle>
+  <p:extLst>
+    <p:ext uri="{EFAFB233-063F-42B5-8137-9DF3F51BA10A}">
+      <p15:sldGuideLst xmlns:p15="http://schemas.microsoft.com/office/powerpoint/2012/main"/>
+    </p:ext>
+  </p:extLst>
 </p:presentation>
+</file>
+
+<file path=ppt/revisionInfo.xml><?xml version="1.0" encoding="utf-8"?>
+<p1510:revInfo xmlns:a="http://schemas.openxmlformats.org/drawingml/2006/main" xmlns:r="http://schemas.openxmlformats.org/officeDocument/2006/relationships" xmlns:p1510="http://schemas.microsoft.com/office/powerpoint/2015/10/main">
+  <p1510:revLst>
+    <p1510:client id="{0A865B0D-DAEC-4817-987B-6AEDEA0241F4}" v="22" dt="2023-05-24T01:10:57.083"/>
+  </p1510:revLst>
+</p1510:revInfo>
+</file>
+
+<file path=ppt/changesInfos/changesInfo1.xml><?xml version="1.0" encoding="utf-8"?>
+<pc:chgInfo xmlns:a="http://schemas.openxmlformats.org/drawingml/2006/main" xmlns:r="http://schemas.openxmlformats.org/officeDocument/2006/relationships" xmlns:ac="http://schemas.microsoft.com/office/drawing/2013/main/command" xmlns:pc="http://schemas.microsoft.com/office/powerpoint/2013/main/command">
+  <pc:docChgLst>
+    <pc:chgData name="Andrew Tucker" userId="19ef2e84b42b9a45" providerId="LiveId" clId="{0A865B0D-DAEC-4817-987B-6AEDEA0241F4}"/>
+    <pc:docChg chg="undo custSel addSld modSld">
+      <pc:chgData name="Andrew Tucker" userId="19ef2e84b42b9a45" providerId="LiveId" clId="{0A865B0D-DAEC-4817-987B-6AEDEA0241F4}" dt="2023-05-24T01:14:41.780" v="360" actId="478"/>
+      <pc:docMkLst>
+        <pc:docMk/>
+      </pc:docMkLst>
+      <pc:sldChg chg="addSp delSp modSp mod">
+        <pc:chgData name="Andrew Tucker" userId="19ef2e84b42b9a45" providerId="LiveId" clId="{0A865B0D-DAEC-4817-987B-6AEDEA0241F4}" dt="2023-05-24T00:25:03.484" v="2" actId="478"/>
+        <pc:sldMkLst>
+          <pc:docMk/>
+          <pc:sldMk cId="2466125759" sldId="260"/>
+        </pc:sldMkLst>
+        <pc:spChg chg="mod">
+          <ac:chgData name="Andrew Tucker" userId="19ef2e84b42b9a45" providerId="LiveId" clId="{0A865B0D-DAEC-4817-987B-6AEDEA0241F4}" dt="2023-05-24T00:24:45.321" v="0" actId="1076"/>
+          <ac:spMkLst>
+            <pc:docMk/>
+            <pc:sldMk cId="2466125759" sldId="260"/>
+            <ac:spMk id="5" creationId="{6669C3EA-5BF8-CF18-81D1-53F7C24AE939}"/>
+          </ac:spMkLst>
+        </pc:spChg>
+        <pc:spChg chg="add del">
+          <ac:chgData name="Andrew Tucker" userId="19ef2e84b42b9a45" providerId="LiveId" clId="{0A865B0D-DAEC-4817-987B-6AEDEA0241F4}" dt="2023-05-24T00:25:03.484" v="2" actId="478"/>
+          <ac:spMkLst>
+            <pc:docMk/>
+            <pc:sldMk cId="2466125759" sldId="260"/>
+            <ac:spMk id="37" creationId="{E2E4799C-7DC3-69E8-64AB-C00AB74A8E2F}"/>
+          </ac:spMkLst>
+        </pc:spChg>
+      </pc:sldChg>
+      <pc:sldChg chg="addSp delSp modSp new mod">
+        <pc:chgData name="Andrew Tucker" userId="19ef2e84b42b9a45" providerId="LiveId" clId="{0A865B0D-DAEC-4817-987B-6AEDEA0241F4}" dt="2023-05-24T01:14:41.780" v="360" actId="478"/>
+        <pc:sldMkLst>
+          <pc:docMk/>
+          <pc:sldMk cId="546736307" sldId="267"/>
+        </pc:sldMkLst>
+        <pc:spChg chg="mod">
+          <ac:chgData name="Andrew Tucker" userId="19ef2e84b42b9a45" providerId="LiveId" clId="{0A865B0D-DAEC-4817-987B-6AEDEA0241F4}" dt="2023-05-24T00:59:52.460" v="154" actId="20577"/>
+          <ac:spMkLst>
+            <pc:docMk/>
+            <pc:sldMk cId="546736307" sldId="267"/>
+            <ac:spMk id="2" creationId="{56FBDC53-A68E-8DBB-10E1-3EA26EF52CB2}"/>
+          </ac:spMkLst>
+        </pc:spChg>
+        <pc:spChg chg="del">
+          <ac:chgData name="Andrew Tucker" userId="19ef2e84b42b9a45" providerId="LiveId" clId="{0A865B0D-DAEC-4817-987B-6AEDEA0241F4}" dt="2023-05-24T00:26:06.553" v="21" actId="478"/>
+          <ac:spMkLst>
+            <pc:docMk/>
+            <pc:sldMk cId="546736307" sldId="267"/>
+            <ac:spMk id="3" creationId="{2D653036-7413-9289-3C36-DCEC24D6CDBD}"/>
+          </ac:spMkLst>
+        </pc:spChg>
+        <pc:spChg chg="del">
+          <ac:chgData name="Andrew Tucker" userId="19ef2e84b42b9a45" providerId="LiveId" clId="{0A865B0D-DAEC-4817-987B-6AEDEA0241F4}" dt="2023-05-24T00:26:06.553" v="21" actId="478"/>
+          <ac:spMkLst>
+            <pc:docMk/>
+            <pc:sldMk cId="546736307" sldId="267"/>
+            <ac:spMk id="4" creationId="{762CC9AF-065F-7E1B-4D0C-5885B6F17827}"/>
+          </ac:spMkLst>
+        </pc:spChg>
+        <pc:spChg chg="del">
+          <ac:chgData name="Andrew Tucker" userId="19ef2e84b42b9a45" providerId="LiveId" clId="{0A865B0D-DAEC-4817-987B-6AEDEA0241F4}" dt="2023-05-24T00:26:06.553" v="21" actId="478"/>
+          <ac:spMkLst>
+            <pc:docMk/>
+            <pc:sldMk cId="546736307" sldId="267"/>
+            <ac:spMk id="5" creationId="{C254002D-7DCC-82AA-CE86-8A1C84EF82CC}"/>
+          </ac:spMkLst>
+        </pc:spChg>
+        <pc:spChg chg="del">
+          <ac:chgData name="Andrew Tucker" userId="19ef2e84b42b9a45" providerId="LiveId" clId="{0A865B0D-DAEC-4817-987B-6AEDEA0241F4}" dt="2023-05-24T00:26:06.553" v="21" actId="478"/>
+          <ac:spMkLst>
+            <pc:docMk/>
+            <pc:sldMk cId="546736307" sldId="267"/>
+            <ac:spMk id="6" creationId="{8D265F3F-7B40-501A-6A7C-38E261E6812B}"/>
+          </ac:spMkLst>
+        </pc:spChg>
+        <pc:spChg chg="add del mod">
+          <ac:chgData name="Andrew Tucker" userId="19ef2e84b42b9a45" providerId="LiveId" clId="{0A865B0D-DAEC-4817-987B-6AEDEA0241F4}" dt="2023-05-24T00:27:09.111" v="29" actId="478"/>
+          <ac:spMkLst>
+            <pc:docMk/>
+            <pc:sldMk cId="546736307" sldId="267"/>
+            <ac:spMk id="7" creationId="{C4F8950E-A579-03D6-6214-0E35ED7968D4}"/>
+          </ac:spMkLst>
+        </pc:spChg>
+        <pc:spChg chg="add del mod">
+          <ac:chgData name="Andrew Tucker" userId="19ef2e84b42b9a45" providerId="LiveId" clId="{0A865B0D-DAEC-4817-987B-6AEDEA0241F4}" dt="2023-05-24T00:26:51.554" v="28" actId="478"/>
+          <ac:spMkLst>
+            <pc:docMk/>
+            <pc:sldMk cId="546736307" sldId="267"/>
+            <ac:spMk id="8" creationId="{B265CE5B-762C-1905-B953-B397B2700D30}"/>
+          </ac:spMkLst>
+        </pc:spChg>
+        <pc:spChg chg="add mod">
+          <ac:chgData name="Andrew Tucker" userId="19ef2e84b42b9a45" providerId="LiveId" clId="{0A865B0D-DAEC-4817-987B-6AEDEA0241F4}" dt="2023-05-24T01:09:24.945" v="304" actId="1076"/>
+          <ac:spMkLst>
+            <pc:docMk/>
+            <pc:sldMk cId="546736307" sldId="267"/>
+            <ac:spMk id="9" creationId="{D8904E72-8A6B-89FC-3D47-13C4441A0A8C}"/>
+          </ac:spMkLst>
+        </pc:spChg>
+        <pc:spChg chg="add mod">
+          <ac:chgData name="Andrew Tucker" userId="19ef2e84b42b9a45" providerId="LiveId" clId="{0A865B0D-DAEC-4817-987B-6AEDEA0241F4}" dt="2023-05-24T01:13:31.546" v="356" actId="1076"/>
+          <ac:spMkLst>
+            <pc:docMk/>
+            <pc:sldMk cId="546736307" sldId="267"/>
+            <ac:spMk id="10" creationId="{FB8D57D6-7F12-2FD2-A5DD-44771B617C67}"/>
+          </ac:spMkLst>
+        </pc:spChg>
+        <pc:spChg chg="add mod">
+          <ac:chgData name="Andrew Tucker" userId="19ef2e84b42b9a45" providerId="LiveId" clId="{0A865B0D-DAEC-4817-987B-6AEDEA0241F4}" dt="2023-05-24T01:13:01.492" v="351" actId="1076"/>
+          <ac:spMkLst>
+            <pc:docMk/>
+            <pc:sldMk cId="546736307" sldId="267"/>
+            <ac:spMk id="11" creationId="{E0998572-3A39-372D-3823-69E0652ECE52}"/>
+          </ac:spMkLst>
+        </pc:spChg>
+        <pc:spChg chg="add mod">
+          <ac:chgData name="Andrew Tucker" userId="19ef2e84b42b9a45" providerId="LiveId" clId="{0A865B0D-DAEC-4817-987B-6AEDEA0241F4}" dt="2023-05-24T01:13:31.546" v="356" actId="1076"/>
+          <ac:spMkLst>
+            <pc:docMk/>
+            <pc:sldMk cId="546736307" sldId="267"/>
+            <ac:spMk id="12" creationId="{284B96C0-4D0B-4E28-208D-B07B28EBF4A0}"/>
+          </ac:spMkLst>
+        </pc:spChg>
+        <pc:spChg chg="add mod">
+          <ac:chgData name="Andrew Tucker" userId="19ef2e84b42b9a45" providerId="LiveId" clId="{0A865B0D-DAEC-4817-987B-6AEDEA0241F4}" dt="2023-05-24T01:13:31.546" v="356" actId="1076"/>
+          <ac:spMkLst>
+            <pc:docMk/>
+            <pc:sldMk cId="546736307" sldId="267"/>
+            <ac:spMk id="13" creationId="{3FD62770-AA1E-A993-1F83-F4DE92E3E5D7}"/>
+          </ac:spMkLst>
+        </pc:spChg>
+        <pc:spChg chg="add del mod">
+          <ac:chgData name="Andrew Tucker" userId="19ef2e84b42b9a45" providerId="LiveId" clId="{0A865B0D-DAEC-4817-987B-6AEDEA0241F4}" dt="2023-05-24T01:01:08.501" v="202" actId="478"/>
+          <ac:spMkLst>
+            <pc:docMk/>
+            <pc:sldMk cId="546736307" sldId="267"/>
+            <ac:spMk id="14" creationId="{DA02AFDF-7376-B0A4-346E-7690424635BF}"/>
+          </ac:spMkLst>
+        </pc:spChg>
+        <pc:spChg chg="add mod">
+          <ac:chgData name="Andrew Tucker" userId="19ef2e84b42b9a45" providerId="LiveId" clId="{0A865B0D-DAEC-4817-987B-6AEDEA0241F4}" dt="2023-05-24T01:13:01.492" v="351" actId="1076"/>
+          <ac:spMkLst>
+            <pc:docMk/>
+            <pc:sldMk cId="546736307" sldId="267"/>
+            <ac:spMk id="15" creationId="{CBA10524-5287-A6A1-64AF-FAB974B3627C}"/>
+          </ac:spMkLst>
+        </pc:spChg>
+        <pc:spChg chg="add mod">
+          <ac:chgData name="Andrew Tucker" userId="19ef2e84b42b9a45" providerId="LiveId" clId="{0A865B0D-DAEC-4817-987B-6AEDEA0241F4}" dt="2023-05-24T01:13:01.492" v="351" actId="1076"/>
+          <ac:spMkLst>
+            <pc:docMk/>
+            <pc:sldMk cId="546736307" sldId="267"/>
+            <ac:spMk id="16" creationId="{C9D3444C-E7C6-3D5B-E79D-CF28D157E46A}"/>
+          </ac:spMkLst>
+        </pc:spChg>
+        <pc:spChg chg="add mod">
+          <ac:chgData name="Andrew Tucker" userId="19ef2e84b42b9a45" providerId="LiveId" clId="{0A865B0D-DAEC-4817-987B-6AEDEA0241F4}" dt="2023-05-24T01:13:01.492" v="351" actId="1076"/>
+          <ac:spMkLst>
+            <pc:docMk/>
+            <pc:sldMk cId="546736307" sldId="267"/>
+            <ac:spMk id="17" creationId="{B3610056-CF8A-AE06-F95F-886A391BB2C6}"/>
+          </ac:spMkLst>
+        </pc:spChg>
+        <pc:spChg chg="add mod">
+          <ac:chgData name="Andrew Tucker" userId="19ef2e84b42b9a45" providerId="LiveId" clId="{0A865B0D-DAEC-4817-987B-6AEDEA0241F4}" dt="2023-05-24T01:13:01.492" v="351" actId="1076"/>
+          <ac:spMkLst>
+            <pc:docMk/>
+            <pc:sldMk cId="546736307" sldId="267"/>
+            <ac:spMk id="18" creationId="{78A3A754-C873-FCD0-BB23-6347632F6BE7}"/>
+          </ac:spMkLst>
+        </pc:spChg>
+        <pc:spChg chg="add mod">
+          <ac:chgData name="Andrew Tucker" userId="19ef2e84b42b9a45" providerId="LiveId" clId="{0A865B0D-DAEC-4817-987B-6AEDEA0241F4}" dt="2023-05-24T01:13:31.546" v="356" actId="1076"/>
+          <ac:spMkLst>
+            <pc:docMk/>
+            <pc:sldMk cId="546736307" sldId="267"/>
+            <ac:spMk id="19" creationId="{8E1F6F78-CE8F-5130-FC96-95EB7A0D7391}"/>
+          </ac:spMkLst>
+        </pc:spChg>
+        <pc:spChg chg="add mod">
+          <ac:chgData name="Andrew Tucker" userId="19ef2e84b42b9a45" providerId="LiveId" clId="{0A865B0D-DAEC-4817-987B-6AEDEA0241F4}" dt="2023-05-24T01:13:31.546" v="356" actId="1076"/>
+          <ac:spMkLst>
+            <pc:docMk/>
+            <pc:sldMk cId="546736307" sldId="267"/>
+            <ac:spMk id="20" creationId="{115A7C45-A216-4111-4964-AE0F8B515DDB}"/>
+          </ac:spMkLst>
+        </pc:spChg>
+        <pc:spChg chg="add del mod">
+          <ac:chgData name="Andrew Tucker" userId="19ef2e84b42b9a45" providerId="LiveId" clId="{0A865B0D-DAEC-4817-987B-6AEDEA0241F4}" dt="2023-05-24T01:06:27.385" v="278" actId="478"/>
+          <ac:spMkLst>
+            <pc:docMk/>
+            <pc:sldMk cId="546736307" sldId="267"/>
+            <ac:spMk id="21" creationId="{B14B9345-CA48-BCC5-92E0-5C072AA4BCC7}"/>
+          </ac:spMkLst>
+        </pc:spChg>
+        <pc:spChg chg="add mod">
+          <ac:chgData name="Andrew Tucker" userId="19ef2e84b42b9a45" providerId="LiveId" clId="{0A865B0D-DAEC-4817-987B-6AEDEA0241F4}" dt="2023-05-24T01:13:31.546" v="356" actId="1076"/>
+          <ac:spMkLst>
+            <pc:docMk/>
+            <pc:sldMk cId="546736307" sldId="267"/>
+            <ac:spMk id="22" creationId="{EFC85F12-1BEC-8EF8-9772-16197C5D228C}"/>
+          </ac:spMkLst>
+        </pc:spChg>
+        <pc:spChg chg="add mod">
+          <ac:chgData name="Andrew Tucker" userId="19ef2e84b42b9a45" providerId="LiveId" clId="{0A865B0D-DAEC-4817-987B-6AEDEA0241F4}" dt="2023-05-24T01:13:01.492" v="351" actId="1076"/>
+          <ac:spMkLst>
+            <pc:docMk/>
+            <pc:sldMk cId="546736307" sldId="267"/>
+            <ac:spMk id="23" creationId="{7432ECED-A79C-84AD-3DE2-CEE048489D80}"/>
+          </ac:spMkLst>
+        </pc:spChg>
+        <pc:spChg chg="add mod">
+          <ac:chgData name="Andrew Tucker" userId="19ef2e84b42b9a45" providerId="LiveId" clId="{0A865B0D-DAEC-4817-987B-6AEDEA0241F4}" dt="2023-05-24T01:13:01.492" v="351" actId="1076"/>
+          <ac:spMkLst>
+            <pc:docMk/>
+            <pc:sldMk cId="546736307" sldId="267"/>
+            <ac:spMk id="24" creationId="{CF0C7405-A870-A1C2-E3EF-9F4E55052FA9}"/>
+          </ac:spMkLst>
+        </pc:spChg>
+        <pc:spChg chg="add mod">
+          <ac:chgData name="Andrew Tucker" userId="19ef2e84b42b9a45" providerId="LiveId" clId="{0A865B0D-DAEC-4817-987B-6AEDEA0241F4}" dt="2023-05-24T01:13:01.492" v="351" actId="1076"/>
+          <ac:spMkLst>
+            <pc:docMk/>
+            <pc:sldMk cId="546736307" sldId="267"/>
+            <ac:spMk id="25" creationId="{427E81B6-5A87-3B50-A5B6-F5B67609861F}"/>
+          </ac:spMkLst>
+        </pc:spChg>
+        <pc:spChg chg="add mod">
+          <ac:chgData name="Andrew Tucker" userId="19ef2e84b42b9a45" providerId="LiveId" clId="{0A865B0D-DAEC-4817-987B-6AEDEA0241F4}" dt="2023-05-24T01:13:01.492" v="351" actId="1076"/>
+          <ac:spMkLst>
+            <pc:docMk/>
+            <pc:sldMk cId="546736307" sldId="267"/>
+            <ac:spMk id="26" creationId="{16998250-390F-69FE-0AF4-3C7A03E2AEBB}"/>
+          </ac:spMkLst>
+        </pc:spChg>
+        <pc:spChg chg="add mod">
+          <ac:chgData name="Andrew Tucker" userId="19ef2e84b42b9a45" providerId="LiveId" clId="{0A865B0D-DAEC-4817-987B-6AEDEA0241F4}" dt="2023-05-24T01:13:01.492" v="351" actId="1076"/>
+          <ac:spMkLst>
+            <pc:docMk/>
+            <pc:sldMk cId="546736307" sldId="267"/>
+            <ac:spMk id="27" creationId="{C5755E01-D60B-53E8-B29C-BDE785E11C87}"/>
+          </ac:spMkLst>
+        </pc:spChg>
+        <pc:spChg chg="add mod">
+          <ac:chgData name="Andrew Tucker" userId="19ef2e84b42b9a45" providerId="LiveId" clId="{0A865B0D-DAEC-4817-987B-6AEDEA0241F4}" dt="2023-05-24T01:13:31.546" v="356" actId="1076"/>
+          <ac:spMkLst>
+            <pc:docMk/>
+            <pc:sldMk cId="546736307" sldId="267"/>
+            <ac:spMk id="28" creationId="{757883C6-F349-4F37-8CFA-504EE494B09D}"/>
+          </ac:spMkLst>
+        </pc:spChg>
+        <pc:spChg chg="add mod">
+          <ac:chgData name="Andrew Tucker" userId="19ef2e84b42b9a45" providerId="LiveId" clId="{0A865B0D-DAEC-4817-987B-6AEDEA0241F4}" dt="2023-05-24T01:13:01.492" v="351" actId="1076"/>
+          <ac:spMkLst>
+            <pc:docMk/>
+            <pc:sldMk cId="546736307" sldId="267"/>
+            <ac:spMk id="29" creationId="{E768FBA7-D474-9D60-4786-6F52AED696D5}"/>
+          </ac:spMkLst>
+        </pc:spChg>
+        <pc:spChg chg="add del mod">
+          <ac:chgData name="Andrew Tucker" userId="19ef2e84b42b9a45" providerId="LiveId" clId="{0A865B0D-DAEC-4817-987B-6AEDEA0241F4}" dt="2023-05-24T01:14:41.780" v="360" actId="478"/>
+          <ac:spMkLst>
+            <pc:docMk/>
+            <pc:sldMk cId="546736307" sldId="267"/>
+            <ac:spMk id="76" creationId="{0B6A1F9F-DBAC-2230-CDCB-65DC3959B278}"/>
+          </ac:spMkLst>
+        </pc:spChg>
+        <pc:cxnChg chg="add mod">
+          <ac:chgData name="Andrew Tucker" userId="19ef2e84b42b9a45" providerId="LiveId" clId="{0A865B0D-DAEC-4817-987B-6AEDEA0241F4}" dt="2023-05-24T01:13:01.492" v="351" actId="1076"/>
+          <ac:cxnSpMkLst>
+            <pc:docMk/>
+            <pc:sldMk cId="546736307" sldId="267"/>
+            <ac:cxnSpMk id="31" creationId="{9B39A633-44F0-1DEA-749D-DA418F59EA82}"/>
+          </ac:cxnSpMkLst>
+        </pc:cxnChg>
+        <pc:cxnChg chg="add mod">
+          <ac:chgData name="Andrew Tucker" userId="19ef2e84b42b9a45" providerId="LiveId" clId="{0A865B0D-DAEC-4817-987B-6AEDEA0241F4}" dt="2023-05-24T01:13:31.546" v="356" actId="1076"/>
+          <ac:cxnSpMkLst>
+            <pc:docMk/>
+            <pc:sldMk cId="546736307" sldId="267"/>
+            <ac:cxnSpMk id="33" creationId="{7C4466A3-88E0-656F-3B91-C04B9C28972A}"/>
+          </ac:cxnSpMkLst>
+        </pc:cxnChg>
+        <pc:cxnChg chg="add mod">
+          <ac:chgData name="Andrew Tucker" userId="19ef2e84b42b9a45" providerId="LiveId" clId="{0A865B0D-DAEC-4817-987B-6AEDEA0241F4}" dt="2023-05-24T01:13:01.492" v="351" actId="1076"/>
+          <ac:cxnSpMkLst>
+            <pc:docMk/>
+            <pc:sldMk cId="546736307" sldId="267"/>
+            <ac:cxnSpMk id="35" creationId="{E48BFB04-06A3-C358-9107-6303278C3B22}"/>
+          </ac:cxnSpMkLst>
+        </pc:cxnChg>
+        <pc:cxnChg chg="add mod">
+          <ac:chgData name="Andrew Tucker" userId="19ef2e84b42b9a45" providerId="LiveId" clId="{0A865B0D-DAEC-4817-987B-6AEDEA0241F4}" dt="2023-05-24T01:13:01.492" v="351" actId="1076"/>
+          <ac:cxnSpMkLst>
+            <pc:docMk/>
+            <pc:sldMk cId="546736307" sldId="267"/>
+            <ac:cxnSpMk id="37" creationId="{FADE2067-72B2-9B7C-A98C-8D551559214C}"/>
+          </ac:cxnSpMkLst>
+        </pc:cxnChg>
+        <pc:cxnChg chg="add mod">
+          <ac:chgData name="Andrew Tucker" userId="19ef2e84b42b9a45" providerId="LiveId" clId="{0A865B0D-DAEC-4817-987B-6AEDEA0241F4}" dt="2023-05-24T01:13:01.492" v="351" actId="1076"/>
+          <ac:cxnSpMkLst>
+            <pc:docMk/>
+            <pc:sldMk cId="546736307" sldId="267"/>
+            <ac:cxnSpMk id="39" creationId="{AE2CBDCB-F5FF-59E3-663C-84AD16708DC6}"/>
+          </ac:cxnSpMkLst>
+        </pc:cxnChg>
+        <pc:cxnChg chg="add mod">
+          <ac:chgData name="Andrew Tucker" userId="19ef2e84b42b9a45" providerId="LiveId" clId="{0A865B0D-DAEC-4817-987B-6AEDEA0241F4}" dt="2023-05-24T01:13:01.492" v="351" actId="1076"/>
+          <ac:cxnSpMkLst>
+            <pc:docMk/>
+            <pc:sldMk cId="546736307" sldId="267"/>
+            <ac:cxnSpMk id="41" creationId="{8E0B1BD9-F292-EE5F-2032-66DD26AED1AC}"/>
+          </ac:cxnSpMkLst>
+        </pc:cxnChg>
+        <pc:cxnChg chg="add mod">
+          <ac:chgData name="Andrew Tucker" userId="19ef2e84b42b9a45" providerId="LiveId" clId="{0A865B0D-DAEC-4817-987B-6AEDEA0241F4}" dt="2023-05-24T01:13:01.492" v="351" actId="1076"/>
+          <ac:cxnSpMkLst>
+            <pc:docMk/>
+            <pc:sldMk cId="546736307" sldId="267"/>
+            <ac:cxnSpMk id="47" creationId="{BA86C07A-82D7-4BF6-6EE0-9068DEA03C9F}"/>
+          </ac:cxnSpMkLst>
+        </pc:cxnChg>
+        <pc:cxnChg chg="add mod">
+          <ac:chgData name="Andrew Tucker" userId="19ef2e84b42b9a45" providerId="LiveId" clId="{0A865B0D-DAEC-4817-987B-6AEDEA0241F4}" dt="2023-05-24T01:13:01.492" v="351" actId="1076"/>
+          <ac:cxnSpMkLst>
+            <pc:docMk/>
+            <pc:sldMk cId="546736307" sldId="267"/>
+            <ac:cxnSpMk id="49" creationId="{C31544F0-D685-E314-CD2C-A737EDCF422C}"/>
+          </ac:cxnSpMkLst>
+        </pc:cxnChg>
+        <pc:cxnChg chg="add mod">
+          <ac:chgData name="Andrew Tucker" userId="19ef2e84b42b9a45" providerId="LiveId" clId="{0A865B0D-DAEC-4817-987B-6AEDEA0241F4}" dt="2023-05-24T01:13:01.492" v="351" actId="1076"/>
+          <ac:cxnSpMkLst>
+            <pc:docMk/>
+            <pc:sldMk cId="546736307" sldId="267"/>
+            <ac:cxnSpMk id="51" creationId="{D96A2B3A-0FA6-1147-C457-07823CE6E5E9}"/>
+          </ac:cxnSpMkLst>
+        </pc:cxnChg>
+        <pc:cxnChg chg="add mod">
+          <ac:chgData name="Andrew Tucker" userId="19ef2e84b42b9a45" providerId="LiveId" clId="{0A865B0D-DAEC-4817-987B-6AEDEA0241F4}" dt="2023-05-24T01:13:01.492" v="351" actId="1076"/>
+          <ac:cxnSpMkLst>
+            <pc:docMk/>
+            <pc:sldMk cId="546736307" sldId="267"/>
+            <ac:cxnSpMk id="53" creationId="{65AAF924-6E86-28E8-560C-15C1F8B8F3BC}"/>
+          </ac:cxnSpMkLst>
+        </pc:cxnChg>
+        <pc:cxnChg chg="add mod">
+          <ac:chgData name="Andrew Tucker" userId="19ef2e84b42b9a45" providerId="LiveId" clId="{0A865B0D-DAEC-4817-987B-6AEDEA0241F4}" dt="2023-05-24T01:13:01.492" v="351" actId="1076"/>
+          <ac:cxnSpMkLst>
+            <pc:docMk/>
+            <pc:sldMk cId="546736307" sldId="267"/>
+            <ac:cxnSpMk id="55" creationId="{709C5B80-E54A-09A4-7A06-29FD69AEEF78}"/>
+          </ac:cxnSpMkLst>
+        </pc:cxnChg>
+        <pc:cxnChg chg="add mod">
+          <ac:chgData name="Andrew Tucker" userId="19ef2e84b42b9a45" providerId="LiveId" clId="{0A865B0D-DAEC-4817-987B-6AEDEA0241F4}" dt="2023-05-24T01:13:01.492" v="351" actId="1076"/>
+          <ac:cxnSpMkLst>
+            <pc:docMk/>
+            <pc:sldMk cId="546736307" sldId="267"/>
+            <ac:cxnSpMk id="57" creationId="{40C28A78-C47E-7040-E4FB-F149CD3D54FB}"/>
+          </ac:cxnSpMkLst>
+        </pc:cxnChg>
+        <pc:cxnChg chg="add mod">
+          <ac:chgData name="Andrew Tucker" userId="19ef2e84b42b9a45" providerId="LiveId" clId="{0A865B0D-DAEC-4817-987B-6AEDEA0241F4}" dt="2023-05-24T01:13:31.546" v="356" actId="1076"/>
+          <ac:cxnSpMkLst>
+            <pc:docMk/>
+            <pc:sldMk cId="546736307" sldId="267"/>
+            <ac:cxnSpMk id="59" creationId="{0420EB38-9795-A55D-D4DC-3D3F951D7851}"/>
+          </ac:cxnSpMkLst>
+        </pc:cxnChg>
+        <pc:cxnChg chg="add mod">
+          <ac:chgData name="Andrew Tucker" userId="19ef2e84b42b9a45" providerId="LiveId" clId="{0A865B0D-DAEC-4817-987B-6AEDEA0241F4}" dt="2023-05-24T01:13:31.546" v="356" actId="1076"/>
+          <ac:cxnSpMkLst>
+            <pc:docMk/>
+            <pc:sldMk cId="546736307" sldId="267"/>
+            <ac:cxnSpMk id="61" creationId="{29794150-5FAC-6086-885B-48830AD95EA0}"/>
+          </ac:cxnSpMkLst>
+        </pc:cxnChg>
+        <pc:cxnChg chg="add mod">
+          <ac:chgData name="Andrew Tucker" userId="19ef2e84b42b9a45" providerId="LiveId" clId="{0A865B0D-DAEC-4817-987B-6AEDEA0241F4}" dt="2023-05-24T01:13:31.546" v="356" actId="1076"/>
+          <ac:cxnSpMkLst>
+            <pc:docMk/>
+            <pc:sldMk cId="546736307" sldId="267"/>
+            <ac:cxnSpMk id="63" creationId="{7DBE1177-1A87-BC1F-20F3-EB5F23421097}"/>
+          </ac:cxnSpMkLst>
+        </pc:cxnChg>
+        <pc:cxnChg chg="add mod">
+          <ac:chgData name="Andrew Tucker" userId="19ef2e84b42b9a45" providerId="LiveId" clId="{0A865B0D-DAEC-4817-987B-6AEDEA0241F4}" dt="2023-05-24T01:13:31.546" v="356" actId="1076"/>
+          <ac:cxnSpMkLst>
+            <pc:docMk/>
+            <pc:sldMk cId="546736307" sldId="267"/>
+            <ac:cxnSpMk id="65" creationId="{DC45E57C-8554-6E20-3EDF-69A2B253B421}"/>
+          </ac:cxnSpMkLst>
+        </pc:cxnChg>
+        <pc:cxnChg chg="add mod">
+          <ac:chgData name="Andrew Tucker" userId="19ef2e84b42b9a45" providerId="LiveId" clId="{0A865B0D-DAEC-4817-987B-6AEDEA0241F4}" dt="2023-05-24T01:13:31.546" v="356" actId="1076"/>
+          <ac:cxnSpMkLst>
+            <pc:docMk/>
+            <pc:sldMk cId="546736307" sldId="267"/>
+            <ac:cxnSpMk id="67" creationId="{6D602385-2202-D51B-E11E-DE9ADFFF7234}"/>
+          </ac:cxnSpMkLst>
+        </pc:cxnChg>
+        <pc:cxnChg chg="add mod">
+          <ac:chgData name="Andrew Tucker" userId="19ef2e84b42b9a45" providerId="LiveId" clId="{0A865B0D-DAEC-4817-987B-6AEDEA0241F4}" dt="2023-05-24T01:13:31.546" v="356" actId="1076"/>
+          <ac:cxnSpMkLst>
+            <pc:docMk/>
+            <pc:sldMk cId="546736307" sldId="267"/>
+            <ac:cxnSpMk id="69" creationId="{941C3518-C61A-F682-B59C-0324D85B12DC}"/>
+          </ac:cxnSpMkLst>
+        </pc:cxnChg>
+      </pc:sldChg>
+    </pc:docChg>
+  </pc:docChgLst>
+</pc:chgInfo>
 </file>
 
 <file path=ppt/slideLayouts/slideLayout1.xml><?xml version="1.0" encoding="utf-8"?>
@@ -264,7 +698,7 @@
           <a:p>
             <a:fld id="{D738C5E4-EEE5-403E-9CE6-D01A97AD1CCE}" type="datetimeFigureOut">
               <a:rPr lang="en-US" smtClean="0"/>
-              <a:t>5/9/2023</a:t>
+              <a:t>5/23/2023</a:t>
             </a:fld>
             <a:endParaRPr lang="en-US"/>
           </a:p>
@@ -462,7 +896,7 @@
           <a:p>
             <a:fld id="{D738C5E4-EEE5-403E-9CE6-D01A97AD1CCE}" type="datetimeFigureOut">
               <a:rPr lang="en-US" smtClean="0"/>
-              <a:t>5/9/2023</a:t>
+              <a:t>5/23/2023</a:t>
             </a:fld>
             <a:endParaRPr lang="en-US"/>
           </a:p>
@@ -670,7 +1104,7 @@
           <a:p>
             <a:fld id="{D738C5E4-EEE5-403E-9CE6-D01A97AD1CCE}" type="datetimeFigureOut">
               <a:rPr lang="en-US" smtClean="0"/>
-              <a:t>5/9/2023</a:t>
+              <a:t>5/23/2023</a:t>
             </a:fld>
             <a:endParaRPr lang="en-US"/>
           </a:p>
@@ -868,7 +1302,7 @@
           <a:p>
             <a:fld id="{D738C5E4-EEE5-403E-9CE6-D01A97AD1CCE}" type="datetimeFigureOut">
               <a:rPr lang="en-US" smtClean="0"/>
-              <a:t>5/9/2023</a:t>
+              <a:t>5/23/2023</a:t>
             </a:fld>
             <a:endParaRPr lang="en-US"/>
           </a:p>
@@ -1143,7 +1577,7 @@
           <a:p>
             <a:fld id="{D738C5E4-EEE5-403E-9CE6-D01A97AD1CCE}" type="datetimeFigureOut">
               <a:rPr lang="en-US" smtClean="0"/>
-              <a:t>5/9/2023</a:t>
+              <a:t>5/23/2023</a:t>
             </a:fld>
             <a:endParaRPr lang="en-US"/>
           </a:p>
@@ -1408,7 +1842,7 @@
           <a:p>
             <a:fld id="{D738C5E4-EEE5-403E-9CE6-D01A97AD1CCE}" type="datetimeFigureOut">
               <a:rPr lang="en-US" smtClean="0"/>
-              <a:t>5/9/2023</a:t>
+              <a:t>5/23/2023</a:t>
             </a:fld>
             <a:endParaRPr lang="en-US"/>
           </a:p>
@@ -1820,7 +2254,7 @@
           <a:p>
             <a:fld id="{D738C5E4-EEE5-403E-9CE6-D01A97AD1CCE}" type="datetimeFigureOut">
               <a:rPr lang="en-US" smtClean="0"/>
-              <a:t>5/9/2023</a:t>
+              <a:t>5/23/2023</a:t>
             </a:fld>
             <a:endParaRPr lang="en-US"/>
           </a:p>
@@ -1961,7 +2395,7 @@
           <a:p>
             <a:fld id="{D738C5E4-EEE5-403E-9CE6-D01A97AD1CCE}" type="datetimeFigureOut">
               <a:rPr lang="en-US" smtClean="0"/>
-              <a:t>5/9/2023</a:t>
+              <a:t>5/23/2023</a:t>
             </a:fld>
             <a:endParaRPr lang="en-US"/>
           </a:p>
@@ -2074,7 +2508,7 @@
           <a:p>
             <a:fld id="{D738C5E4-EEE5-403E-9CE6-D01A97AD1CCE}" type="datetimeFigureOut">
               <a:rPr lang="en-US" smtClean="0"/>
-              <a:t>5/9/2023</a:t>
+              <a:t>5/23/2023</a:t>
             </a:fld>
             <a:endParaRPr lang="en-US"/>
           </a:p>
@@ -2385,7 +2819,7 @@
           <a:p>
             <a:fld id="{D738C5E4-EEE5-403E-9CE6-D01A97AD1CCE}" type="datetimeFigureOut">
               <a:rPr lang="en-US" smtClean="0"/>
-              <a:t>5/9/2023</a:t>
+              <a:t>5/23/2023</a:t>
             </a:fld>
             <a:endParaRPr lang="en-US"/>
           </a:p>
@@ -2673,7 +3107,7 @@
           <a:p>
             <a:fld id="{D738C5E4-EEE5-403E-9CE6-D01A97AD1CCE}" type="datetimeFigureOut">
               <a:rPr lang="en-US" smtClean="0"/>
-              <a:t>5/9/2023</a:t>
+              <a:t>5/23/2023</a:t>
             </a:fld>
             <a:endParaRPr lang="en-US"/>
           </a:p>
@@ -2914,7 +3348,7 @@
           <a:p>
             <a:fld id="{D738C5E4-EEE5-403E-9CE6-D01A97AD1CCE}" type="datetimeFigureOut">
               <a:rPr lang="en-US" smtClean="0"/>
-              <a:t>5/9/2023</a:t>
+              <a:t>5/23/2023</a:t>
             </a:fld>
             <a:endParaRPr lang="en-US"/>
           </a:p>
@@ -3434,6 +3868,132 @@
           <p:cNvPr id="2" name="Title 1">
             <a:extLst>
               <a:ext uri="{FF2B5EF4-FFF2-40B4-BE49-F238E27FC236}">
+                <a16:creationId xmlns:a16="http://schemas.microsoft.com/office/drawing/2014/main" id="{63C1546D-A12B-D4A4-B7C0-631734AE7CEF}"/>
+              </a:ext>
+            </a:extLst>
+          </p:cNvPr>
+          <p:cNvSpPr>
+            <a:spLocks noGrp="1"/>
+          </p:cNvSpPr>
+          <p:nvPr>
+            <p:ph type="title"/>
+          </p:nvPr>
+        </p:nvSpPr>
+        <p:spPr/>
+        <p:txBody>
+          <a:bodyPr/>
+          <a:lstStyle/>
+          <a:p>
+            <a:r>
+              <a:rPr lang="en-US" dirty="0"/>
+              <a:t>Analysis</a:t>
+            </a:r>
+          </a:p>
+        </p:txBody>
+      </p:sp>
+      <p:sp>
+        <p:nvSpPr>
+          <p:cNvPr id="3" name="Content Placeholder 2">
+            <a:extLst>
+              <a:ext uri="{FF2B5EF4-FFF2-40B4-BE49-F238E27FC236}">
+                <a16:creationId xmlns:a16="http://schemas.microsoft.com/office/drawing/2014/main" id="{39C748A9-88EB-414A-C1DB-CF0598EBC387}"/>
+              </a:ext>
+            </a:extLst>
+          </p:cNvPr>
+          <p:cNvSpPr>
+            <a:spLocks noGrp="1"/>
+          </p:cNvSpPr>
+          <p:nvPr>
+            <p:ph idx="1"/>
+          </p:nvPr>
+        </p:nvSpPr>
+        <p:spPr/>
+        <p:txBody>
+          <a:bodyPr/>
+          <a:lstStyle/>
+          <a:p>
+            <a:r>
+              <a:rPr lang="en-US" dirty="0"/>
+              <a:t>Unfortunately, the simulation is flawed, and currently the effects of pedestrians are either: nonexistent for sufficiently small numbers of pedestrians, or infinite for sufficiently large numbers</a:t>
+            </a:r>
+          </a:p>
+          <a:p>
+            <a:r>
+              <a:rPr lang="en-US" dirty="0"/>
+              <a:t>We will use a linear regression model to create a line between the number of pedestrians and the traffic flow, both entering and exiting the roundabout</a:t>
+            </a:r>
+          </a:p>
+          <a:p>
+            <a:pPr lvl="1"/>
+            <a:r>
+              <a:rPr lang="en-US" dirty="0"/>
+              <a:t>The x-axis will be representative of the number of pedestrians</a:t>
+            </a:r>
+          </a:p>
+          <a:p>
+            <a:pPr lvl="2"/>
+            <a:r>
+              <a:rPr lang="en-US" dirty="0"/>
+              <a:t>x=0 corresponds to no pedestrians</a:t>
+            </a:r>
+          </a:p>
+          <a:p>
+            <a:pPr lvl="1"/>
+            <a:r>
+              <a:rPr lang="en-US" dirty="0"/>
+              <a:t>The y-axis will be representative of the average traffic flow across all 4 directions</a:t>
+            </a:r>
+          </a:p>
+          <a:p>
+            <a:pPr lvl="2"/>
+            <a:r>
+              <a:rPr lang="en-US" dirty="0"/>
+              <a:t>We will have 2 graphs, one for entering traffic and one for exiting traffic</a:t>
+            </a:r>
+          </a:p>
+          <a:p>
+            <a:pPr marL="457200" lvl="1" indent="0">
+              <a:buNone/>
+            </a:pPr>
+            <a:endParaRPr lang="en-US" dirty="0"/>
+          </a:p>
+        </p:txBody>
+      </p:sp>
+    </p:spTree>
+    <p:extLst>
+      <p:ext uri="{BB962C8B-B14F-4D97-AF65-F5344CB8AC3E}">
+        <p14:creationId xmlns:p14="http://schemas.microsoft.com/office/powerpoint/2010/main" val="3410322686"/>
+      </p:ext>
+    </p:extLst>
+  </p:cSld>
+  <p:clrMapOvr>
+    <a:masterClrMapping/>
+  </p:clrMapOvr>
+</p:sld>
+</file>
+
+<file path=ppt/slides/slide11.xml><?xml version="1.0" encoding="utf-8"?>
+<p:sld xmlns:a="http://schemas.openxmlformats.org/drawingml/2006/main" xmlns:r="http://schemas.openxmlformats.org/officeDocument/2006/relationships" xmlns:p="http://schemas.openxmlformats.org/presentationml/2006/main">
+  <p:cSld>
+    <p:spTree>
+      <p:nvGrpSpPr>
+        <p:cNvPr id="1" name=""/>
+        <p:cNvGrpSpPr/>
+        <p:nvPr/>
+      </p:nvGrpSpPr>
+      <p:grpSpPr>
+        <a:xfrm>
+          <a:off x="0" y="0"/>
+          <a:ext cx="0" cy="0"/>
+          <a:chOff x="0" y="0"/>
+          <a:chExt cx="0" cy="0"/>
+        </a:xfrm>
+      </p:grpSpPr>
+      <p:sp>
+        <p:nvSpPr>
+          <p:cNvPr id="2" name="Title 1">
+            <a:extLst>
+              <a:ext uri="{FF2B5EF4-FFF2-40B4-BE49-F238E27FC236}">
                 <a16:creationId xmlns:a16="http://schemas.microsoft.com/office/drawing/2014/main" id="{7A95D50A-47A1-2C57-F823-C290A4784964}"/>
               </a:ext>
             </a:extLst>
@@ -3504,7 +4064,7 @@
 </p:sld>
 </file>
 
-<file path=ppt/slides/slide11.xml><?xml version="1.0" encoding="utf-8"?>
+<file path=ppt/slides/slide12.xml><?xml version="1.0" encoding="utf-8"?>
 <p:sld xmlns:a="http://schemas.openxmlformats.org/drawingml/2006/main" xmlns:r="http://schemas.openxmlformats.org/officeDocument/2006/relationships" xmlns:p="http://schemas.openxmlformats.org/presentationml/2006/main">
   <p:cSld>
     <p:spTree>
@@ -4404,7 +4964,12 @@
             <p:ph type="body" sz="quarter" idx="3"/>
           </p:nvPr>
         </p:nvSpPr>
-        <p:spPr/>
+        <p:spPr>
+          <a:xfrm>
+            <a:off x="6226978" y="1676555"/>
+            <a:ext cx="5183188" cy="823912"/>
+          </a:xfrm>
+        </p:spPr>
         <p:txBody>
           <a:bodyPr/>
           <a:lstStyle/>
@@ -5358,7 +5923,7 @@
           <p:cNvPr id="2" name="Title 1">
             <a:extLst>
               <a:ext uri="{FF2B5EF4-FFF2-40B4-BE49-F238E27FC236}">
-                <a16:creationId xmlns:a16="http://schemas.microsoft.com/office/drawing/2014/main" id="{2C6B1A2F-8098-2A67-A838-22EED4D2C903}"/>
+                <a16:creationId xmlns:a16="http://schemas.microsoft.com/office/drawing/2014/main" id="{56FBDC53-A68E-8DBB-10E1-3EA26EF52CB2}"/>
               </a:ext>
             </a:extLst>
           </p:cNvPr>
@@ -5376,111 +5941,1504 @@
           <a:p>
             <a:r>
               <a:rPr lang="en-US" dirty="0"/>
-              <a:t>Simulation</a:t>
-            </a:r>
-          </a:p>
-        </p:txBody>
-      </p:sp>
-      <p:sp>
-        <p:nvSpPr>
-          <p:cNvPr id="3" name="Content Placeholder 2">
-            <a:extLst>
-              <a:ext uri="{FF2B5EF4-FFF2-40B4-BE49-F238E27FC236}">
-                <a16:creationId xmlns:a16="http://schemas.microsoft.com/office/drawing/2014/main" id="{13942F4E-0FC6-BB89-A203-DD5CF97DD95F}"/>
-              </a:ext>
-            </a:extLst>
-          </p:cNvPr>
-          <p:cNvSpPr>
-            <a:spLocks noGrp="1"/>
-          </p:cNvSpPr>
-          <p:nvPr>
-            <p:ph idx="1"/>
-          </p:nvPr>
-        </p:nvSpPr>
-        <p:spPr/>
-        <p:txBody>
-          <a:bodyPr/>
-          <a:lstStyle/>
-          <a:p>
-            <a:pPr marL="514350" indent="-514350">
-              <a:buFont typeface="+mj-lt"/>
-              <a:buAutoNum type="arabicPeriod"/>
-            </a:pPr>
-            <a:r>
-              <a:rPr lang="en-US" dirty="0"/>
-              <a:t>Generate a list of cars and pedestrians</a:t>
-            </a:r>
-          </a:p>
-          <a:p>
-            <a:pPr marL="914400" lvl="1" indent="-457200">
-              <a:buFont typeface="+mj-lt"/>
-              <a:buAutoNum type="arabicPeriod"/>
-            </a:pPr>
-            <a:r>
-              <a:rPr lang="en-US" dirty="0"/>
-              <a:t>This will always generate the same 150 cars, where a car starts with a location and destination</a:t>
-            </a:r>
-          </a:p>
-          <a:p>
-            <a:pPr marL="514350" indent="-514350">
-              <a:buFont typeface="+mj-lt"/>
-              <a:buAutoNum type="arabicPeriod"/>
-            </a:pPr>
-            <a:r>
-              <a:rPr lang="en-US" dirty="0"/>
-              <a:t>Until all the cars have made it through the roundabout:</a:t>
-            </a:r>
-          </a:p>
-          <a:p>
-            <a:pPr marL="914400" lvl="1" indent="-457200">
-              <a:buFont typeface="+mj-lt"/>
-              <a:buAutoNum type="arabicPeriod"/>
-            </a:pPr>
-            <a:r>
-              <a:rPr lang="en-US" dirty="0"/>
-              <a:t>Evaluate the decision of each pedestrian first</a:t>
-            </a:r>
-          </a:p>
-          <a:p>
-            <a:pPr marL="914400" lvl="1" indent="-457200">
-              <a:buFont typeface="+mj-lt"/>
-              <a:buAutoNum type="arabicPeriod"/>
-            </a:pPr>
-            <a:r>
-              <a:rPr lang="en-US" dirty="0"/>
-              <a:t>Evaluate the decision of cars waiting to exit the system</a:t>
-            </a:r>
-          </a:p>
-          <a:p>
-            <a:pPr marL="914400" lvl="1" indent="-457200">
-              <a:buFont typeface="+mj-lt"/>
-              <a:buAutoNum type="arabicPeriod"/>
-            </a:pPr>
-            <a:r>
-              <a:rPr lang="en-US" dirty="0"/>
-              <a:t>Evaluate the decision of cars within the traffic circle</a:t>
-            </a:r>
-          </a:p>
-          <a:p>
-            <a:pPr marL="914400" lvl="1" indent="-457200">
-              <a:buFont typeface="+mj-lt"/>
-              <a:buAutoNum type="arabicPeriod"/>
-            </a:pPr>
-            <a:r>
-              <a:rPr lang="en-US" dirty="0"/>
-              <a:t>Evaluate the decision of cars that have yet to enter the circle</a:t>
-            </a:r>
-          </a:p>
-          <a:p>
-            <a:pPr lvl="1"/>
+              <a:t>Car Decision Tree</a:t>
+            </a:r>
+          </a:p>
+        </p:txBody>
+      </p:sp>
+      <p:sp>
+        <p:nvSpPr>
+          <p:cNvPr id="9" name="TextBox 8">
+            <a:extLst>
+              <a:ext uri="{FF2B5EF4-FFF2-40B4-BE49-F238E27FC236}">
+                <a16:creationId xmlns:a16="http://schemas.microsoft.com/office/drawing/2014/main" id="{D8904E72-8A6B-89FC-3D47-13C4441A0A8C}"/>
+              </a:ext>
+            </a:extLst>
+          </p:cNvPr>
+          <p:cNvSpPr txBox="1"/>
+          <p:nvPr/>
+        </p:nvSpPr>
+        <p:spPr>
+          <a:xfrm>
+            <a:off x="5607728" y="3768882"/>
+            <a:ext cx="976544" cy="369332"/>
+          </a:xfrm>
+          <a:prstGeom prst="rect">
+            <a:avLst/>
+          </a:prstGeom>
+          <a:noFill/>
+          <a:ln>
+            <a:solidFill>
+              <a:schemeClr val="tx1"/>
+            </a:solidFill>
+          </a:ln>
+        </p:spPr>
+        <p:txBody>
+          <a:bodyPr wrap="square" rtlCol="0" anchor="ctr">
+            <a:spAutoFit/>
+          </a:bodyPr>
+          <a:lstStyle/>
+          <a:p>
+            <a:pPr algn="ctr"/>
+            <a:r>
+              <a:rPr lang="en-US" dirty="0"/>
+              <a:t>In circle</a:t>
+            </a:r>
+          </a:p>
+        </p:txBody>
+      </p:sp>
+      <p:sp>
+        <p:nvSpPr>
+          <p:cNvPr id="10" name="TextBox 9">
+            <a:extLst>
+              <a:ext uri="{FF2B5EF4-FFF2-40B4-BE49-F238E27FC236}">
+                <a16:creationId xmlns:a16="http://schemas.microsoft.com/office/drawing/2014/main" id="{FB8D57D6-7F12-2FD2-A5DD-44771B617C67}"/>
+              </a:ext>
+            </a:extLst>
+          </p:cNvPr>
+          <p:cNvSpPr txBox="1"/>
+          <p:nvPr/>
+        </p:nvSpPr>
+        <p:spPr>
+          <a:xfrm>
+            <a:off x="7560816" y="4244665"/>
+            <a:ext cx="976544" cy="369332"/>
+          </a:xfrm>
+          <a:prstGeom prst="rect">
+            <a:avLst/>
+          </a:prstGeom>
+          <a:noFill/>
+          <a:ln>
+            <a:solidFill>
+              <a:schemeClr val="tx1"/>
+            </a:solidFill>
+          </a:ln>
+        </p:spPr>
+        <p:txBody>
+          <a:bodyPr wrap="square" rtlCol="0" anchor="ctr">
+            <a:spAutoFit/>
+          </a:bodyPr>
+          <a:lstStyle/>
+          <a:p>
+            <a:pPr algn="ctr"/>
+            <a:r>
+              <a:rPr lang="en-US" dirty="0"/>
+              <a:t>At exit</a:t>
+            </a:r>
+          </a:p>
+        </p:txBody>
+      </p:sp>
+      <p:sp>
+        <p:nvSpPr>
+          <p:cNvPr id="11" name="TextBox 10">
+            <a:extLst>
+              <a:ext uri="{FF2B5EF4-FFF2-40B4-BE49-F238E27FC236}">
+                <a16:creationId xmlns:a16="http://schemas.microsoft.com/office/drawing/2014/main" id="{E0998572-3A39-372D-3823-69E0652ECE52}"/>
+              </a:ext>
+            </a:extLst>
+          </p:cNvPr>
+          <p:cNvSpPr txBox="1"/>
+          <p:nvPr/>
+        </p:nvSpPr>
+        <p:spPr>
+          <a:xfrm>
+            <a:off x="3850382" y="4244665"/>
+            <a:ext cx="976544" cy="369332"/>
+          </a:xfrm>
+          <a:prstGeom prst="rect">
+            <a:avLst/>
+          </a:prstGeom>
+          <a:noFill/>
+          <a:ln>
+            <a:solidFill>
+              <a:schemeClr val="tx1"/>
+            </a:solidFill>
+          </a:ln>
+        </p:spPr>
+        <p:txBody>
+          <a:bodyPr wrap="square" rtlCol="0" anchor="ctr">
+            <a:spAutoFit/>
+          </a:bodyPr>
+          <a:lstStyle/>
+          <a:p>
+            <a:pPr algn="ctr"/>
+            <a:r>
+              <a:rPr lang="en-US" dirty="0"/>
+              <a:t>Exited</a:t>
+            </a:r>
+          </a:p>
+        </p:txBody>
+      </p:sp>
+      <p:sp>
+        <p:nvSpPr>
+          <p:cNvPr id="12" name="TextBox 11">
+            <a:extLst>
+              <a:ext uri="{FF2B5EF4-FFF2-40B4-BE49-F238E27FC236}">
+                <a16:creationId xmlns:a16="http://schemas.microsoft.com/office/drawing/2014/main" id="{284B96C0-4D0B-4E28-208D-B07B28EBF4A0}"/>
+              </a:ext>
+            </a:extLst>
+          </p:cNvPr>
+          <p:cNvSpPr txBox="1"/>
+          <p:nvPr/>
+        </p:nvSpPr>
+        <p:spPr>
+          <a:xfrm>
+            <a:off x="8537360" y="4771441"/>
+            <a:ext cx="976544" cy="369332"/>
+          </a:xfrm>
+          <a:prstGeom prst="rect">
+            <a:avLst/>
+          </a:prstGeom>
+          <a:noFill/>
+          <a:ln>
+            <a:solidFill>
+              <a:schemeClr val="tx1"/>
+            </a:solidFill>
+          </a:ln>
+        </p:spPr>
+        <p:txBody>
+          <a:bodyPr wrap="square" rtlCol="0" anchor="ctr">
+            <a:spAutoFit/>
+          </a:bodyPr>
+          <a:lstStyle/>
+          <a:p>
+            <a:pPr algn="ctr"/>
+            <a:r>
+              <a:rPr lang="en-US" dirty="0"/>
+              <a:t>Blocked</a:t>
+            </a:r>
+          </a:p>
+        </p:txBody>
+      </p:sp>
+      <p:sp>
+        <p:nvSpPr>
+          <p:cNvPr id="13" name="TextBox 12">
+            <a:extLst>
+              <a:ext uri="{FF2B5EF4-FFF2-40B4-BE49-F238E27FC236}">
+                <a16:creationId xmlns:a16="http://schemas.microsoft.com/office/drawing/2014/main" id="{3FD62770-AA1E-A993-1F83-F4DE92E3E5D7}"/>
+              </a:ext>
+            </a:extLst>
+          </p:cNvPr>
+          <p:cNvSpPr txBox="1"/>
+          <p:nvPr/>
+        </p:nvSpPr>
+        <p:spPr>
+          <a:xfrm>
+            <a:off x="6584272" y="4771441"/>
+            <a:ext cx="976544" cy="369332"/>
+          </a:xfrm>
+          <a:prstGeom prst="rect">
+            <a:avLst/>
+          </a:prstGeom>
+          <a:noFill/>
+          <a:ln>
+            <a:solidFill>
+              <a:schemeClr val="tx1"/>
+            </a:solidFill>
+          </a:ln>
+        </p:spPr>
+        <p:txBody>
+          <a:bodyPr wrap="square" rtlCol="0" anchor="ctr">
+            <a:spAutoFit/>
+          </a:bodyPr>
+          <a:lstStyle/>
+          <a:p>
+            <a:pPr algn="ctr"/>
+            <a:r>
+              <a:rPr lang="en-US" dirty="0"/>
+              <a:t>Blocked</a:t>
+            </a:r>
+          </a:p>
+        </p:txBody>
+      </p:sp>
+      <p:sp>
+        <p:nvSpPr>
+          <p:cNvPr id="15" name="TextBox 14">
+            <a:extLst>
+              <a:ext uri="{FF2B5EF4-FFF2-40B4-BE49-F238E27FC236}">
+                <a16:creationId xmlns:a16="http://schemas.microsoft.com/office/drawing/2014/main" id="{CBA10524-5287-A6A1-64AF-FAB974B3627C}"/>
+              </a:ext>
+            </a:extLst>
+          </p:cNvPr>
+          <p:cNvSpPr txBox="1"/>
+          <p:nvPr/>
+        </p:nvSpPr>
+        <p:spPr>
+          <a:xfrm>
+            <a:off x="4826926" y="4771441"/>
+            <a:ext cx="976544" cy="369332"/>
+          </a:xfrm>
+          <a:prstGeom prst="rect">
+            <a:avLst/>
+          </a:prstGeom>
+          <a:noFill/>
+          <a:ln>
+            <a:solidFill>
+              <a:schemeClr val="tx1"/>
+            </a:solidFill>
+          </a:ln>
+        </p:spPr>
+        <p:txBody>
+          <a:bodyPr wrap="square" rtlCol="0" anchor="ctr">
+            <a:spAutoFit/>
+          </a:bodyPr>
+          <a:lstStyle/>
+          <a:p>
+            <a:pPr algn="ctr"/>
+            <a:r>
+              <a:rPr lang="en-US" dirty="0"/>
+              <a:t>P x-</a:t>
+            </a:r>
+            <a:r>
+              <a:rPr lang="en-US" dirty="0" err="1"/>
+              <a:t>ing</a:t>
+            </a:r>
             <a:endParaRPr lang="en-US" dirty="0"/>
           </a:p>
         </p:txBody>
       </p:sp>
+      <p:sp>
+        <p:nvSpPr>
+          <p:cNvPr id="16" name="TextBox 15">
+            <a:extLst>
+              <a:ext uri="{FF2B5EF4-FFF2-40B4-BE49-F238E27FC236}">
+                <a16:creationId xmlns:a16="http://schemas.microsoft.com/office/drawing/2014/main" id="{C9D3444C-E7C6-3D5B-E79D-CF28D157E46A}"/>
+              </a:ext>
+            </a:extLst>
+          </p:cNvPr>
+          <p:cNvSpPr txBox="1"/>
+          <p:nvPr/>
+        </p:nvSpPr>
+        <p:spPr>
+          <a:xfrm>
+            <a:off x="2873838" y="4771441"/>
+            <a:ext cx="976544" cy="369332"/>
+          </a:xfrm>
+          <a:prstGeom prst="rect">
+            <a:avLst/>
+          </a:prstGeom>
+          <a:noFill/>
+          <a:ln>
+            <a:solidFill>
+              <a:schemeClr val="tx1"/>
+            </a:solidFill>
+          </a:ln>
+        </p:spPr>
+        <p:txBody>
+          <a:bodyPr wrap="square" rtlCol="0" anchor="ctr">
+            <a:spAutoFit/>
+          </a:bodyPr>
+          <a:lstStyle/>
+          <a:p>
+            <a:pPr algn="ctr"/>
+            <a:r>
+              <a:rPr lang="en-US" dirty="0"/>
+              <a:t>At circle</a:t>
+            </a:r>
+          </a:p>
+        </p:txBody>
+      </p:sp>
+      <p:sp>
+        <p:nvSpPr>
+          <p:cNvPr id="17" name="TextBox 16">
+            <a:extLst>
+              <a:ext uri="{FF2B5EF4-FFF2-40B4-BE49-F238E27FC236}">
+                <a16:creationId xmlns:a16="http://schemas.microsoft.com/office/drawing/2014/main" id="{B3610056-CF8A-AE06-F95F-886A391BB2C6}"/>
+              </a:ext>
+            </a:extLst>
+          </p:cNvPr>
+          <p:cNvSpPr txBox="1"/>
+          <p:nvPr/>
+        </p:nvSpPr>
+        <p:spPr>
+          <a:xfrm>
+            <a:off x="3618362" y="5298217"/>
+            <a:ext cx="976544" cy="369332"/>
+          </a:xfrm>
+          <a:prstGeom prst="rect">
+            <a:avLst/>
+          </a:prstGeom>
+          <a:noFill/>
+          <a:ln>
+            <a:solidFill>
+              <a:schemeClr val="tx1"/>
+            </a:solidFill>
+          </a:ln>
+        </p:spPr>
+        <p:txBody>
+          <a:bodyPr wrap="square" rtlCol="0" anchor="ctr">
+            <a:spAutoFit/>
+          </a:bodyPr>
+          <a:lstStyle/>
+          <a:p>
+            <a:pPr algn="ctr"/>
+            <a:r>
+              <a:rPr lang="en-US" dirty="0"/>
+              <a:t>Blocked</a:t>
+            </a:r>
+          </a:p>
+        </p:txBody>
+      </p:sp>
+      <p:sp>
+        <p:nvSpPr>
+          <p:cNvPr id="18" name="TextBox 17">
+            <a:extLst>
+              <a:ext uri="{FF2B5EF4-FFF2-40B4-BE49-F238E27FC236}">
+                <a16:creationId xmlns:a16="http://schemas.microsoft.com/office/drawing/2014/main" id="{78A3A754-C873-FCD0-BB23-6347632F6BE7}"/>
+              </a:ext>
+            </a:extLst>
+          </p:cNvPr>
+          <p:cNvSpPr txBox="1"/>
+          <p:nvPr/>
+        </p:nvSpPr>
+        <p:spPr>
+          <a:xfrm>
+            <a:off x="2168566" y="5298217"/>
+            <a:ext cx="976544" cy="369332"/>
+          </a:xfrm>
+          <a:prstGeom prst="rect">
+            <a:avLst/>
+          </a:prstGeom>
+          <a:noFill/>
+          <a:ln>
+            <a:solidFill>
+              <a:schemeClr val="tx1"/>
+            </a:solidFill>
+          </a:ln>
+        </p:spPr>
+        <p:txBody>
+          <a:bodyPr wrap="square" rtlCol="0" anchor="ctr">
+            <a:spAutoFit/>
+          </a:bodyPr>
+          <a:lstStyle/>
+          <a:p>
+            <a:pPr algn="ctr"/>
+            <a:r>
+              <a:rPr lang="en-US" dirty="0"/>
+              <a:t>P x-</a:t>
+            </a:r>
+            <a:r>
+              <a:rPr lang="en-US" dirty="0" err="1"/>
+              <a:t>ing</a:t>
+            </a:r>
+            <a:endParaRPr lang="en-US" dirty="0"/>
+          </a:p>
+        </p:txBody>
+      </p:sp>
+      <p:sp>
+        <p:nvSpPr>
+          <p:cNvPr id="19" name="TextBox 18">
+            <a:extLst>
+              <a:ext uri="{FF2B5EF4-FFF2-40B4-BE49-F238E27FC236}">
+                <a16:creationId xmlns:a16="http://schemas.microsoft.com/office/drawing/2014/main" id="{8E1F6F78-CE8F-5130-FC96-95EB7A0D7391}"/>
+              </a:ext>
+            </a:extLst>
+          </p:cNvPr>
+          <p:cNvSpPr txBox="1"/>
+          <p:nvPr/>
+        </p:nvSpPr>
+        <p:spPr>
+          <a:xfrm>
+            <a:off x="8274434" y="5298217"/>
+            <a:ext cx="525850" cy="369332"/>
+          </a:xfrm>
+          <a:prstGeom prst="rect">
+            <a:avLst/>
+          </a:prstGeom>
+          <a:noFill/>
+        </p:spPr>
+        <p:txBody>
+          <a:bodyPr wrap="none" rtlCol="0">
+            <a:spAutoFit/>
+          </a:bodyPr>
+          <a:lstStyle/>
+          <a:p>
+            <a:r>
+              <a:rPr lang="en-US" dirty="0"/>
+              <a:t>exit</a:t>
+            </a:r>
+          </a:p>
+        </p:txBody>
+      </p:sp>
+      <p:sp>
+        <p:nvSpPr>
+          <p:cNvPr id="20" name="TextBox 19">
+            <a:extLst>
+              <a:ext uri="{FF2B5EF4-FFF2-40B4-BE49-F238E27FC236}">
+                <a16:creationId xmlns:a16="http://schemas.microsoft.com/office/drawing/2014/main" id="{115A7C45-A216-4111-4964-AE0F8B515DDB}"/>
+              </a:ext>
+            </a:extLst>
+          </p:cNvPr>
+          <p:cNvSpPr txBox="1"/>
+          <p:nvPr/>
+        </p:nvSpPr>
+        <p:spPr>
+          <a:xfrm>
+            <a:off x="9220073" y="5298217"/>
+            <a:ext cx="587661" cy="369332"/>
+          </a:xfrm>
+          <a:prstGeom prst="rect">
+            <a:avLst/>
+          </a:prstGeom>
+          <a:noFill/>
+        </p:spPr>
+        <p:txBody>
+          <a:bodyPr wrap="none" rtlCol="0">
+            <a:spAutoFit/>
+          </a:bodyPr>
+          <a:lstStyle/>
+          <a:p>
+            <a:r>
+              <a:rPr lang="en-US" dirty="0"/>
+              <a:t>wait</a:t>
+            </a:r>
+          </a:p>
+        </p:txBody>
+      </p:sp>
+      <p:sp>
+        <p:nvSpPr>
+          <p:cNvPr id="22" name="TextBox 21">
+            <a:extLst>
+              <a:ext uri="{FF2B5EF4-FFF2-40B4-BE49-F238E27FC236}">
+                <a16:creationId xmlns:a16="http://schemas.microsoft.com/office/drawing/2014/main" id="{EFC85F12-1BEC-8EF8-9772-16197C5D228C}"/>
+              </a:ext>
+            </a:extLst>
+          </p:cNvPr>
+          <p:cNvSpPr txBox="1"/>
+          <p:nvPr/>
+        </p:nvSpPr>
+        <p:spPr>
+          <a:xfrm>
+            <a:off x="7266985" y="5298217"/>
+            <a:ext cx="587661" cy="369332"/>
+          </a:xfrm>
+          <a:prstGeom prst="rect">
+            <a:avLst/>
+          </a:prstGeom>
+          <a:noFill/>
+        </p:spPr>
+        <p:txBody>
+          <a:bodyPr wrap="none" rtlCol="0">
+            <a:spAutoFit/>
+          </a:bodyPr>
+          <a:lstStyle/>
+          <a:p>
+            <a:r>
+              <a:rPr lang="en-US" dirty="0"/>
+              <a:t>wait</a:t>
+            </a:r>
+          </a:p>
+        </p:txBody>
+      </p:sp>
+      <p:sp>
+        <p:nvSpPr>
+          <p:cNvPr id="23" name="TextBox 22">
+            <a:extLst>
+              <a:ext uri="{FF2B5EF4-FFF2-40B4-BE49-F238E27FC236}">
+                <a16:creationId xmlns:a16="http://schemas.microsoft.com/office/drawing/2014/main" id="{7432ECED-A79C-84AD-3DE2-CEE048489D80}"/>
+              </a:ext>
+            </a:extLst>
+          </p:cNvPr>
+          <p:cNvSpPr txBox="1"/>
+          <p:nvPr/>
+        </p:nvSpPr>
+        <p:spPr>
+          <a:xfrm>
+            <a:off x="4239265" y="5824993"/>
+            <a:ext cx="587661" cy="369332"/>
+          </a:xfrm>
+          <a:prstGeom prst="rect">
+            <a:avLst/>
+          </a:prstGeom>
+          <a:noFill/>
+        </p:spPr>
+        <p:txBody>
+          <a:bodyPr wrap="none" rtlCol="0">
+            <a:spAutoFit/>
+          </a:bodyPr>
+          <a:lstStyle/>
+          <a:p>
+            <a:r>
+              <a:rPr lang="en-US" dirty="0"/>
+              <a:t>wait</a:t>
+            </a:r>
+          </a:p>
+        </p:txBody>
+      </p:sp>
+      <p:sp>
+        <p:nvSpPr>
+          <p:cNvPr id="24" name="TextBox 23">
+            <a:extLst>
+              <a:ext uri="{FF2B5EF4-FFF2-40B4-BE49-F238E27FC236}">
+                <a16:creationId xmlns:a16="http://schemas.microsoft.com/office/drawing/2014/main" id="{CF0C7405-A870-A1C2-E3EF-9F4E55052FA9}"/>
+              </a:ext>
+            </a:extLst>
+          </p:cNvPr>
+          <p:cNvSpPr txBox="1"/>
+          <p:nvPr/>
+        </p:nvSpPr>
+        <p:spPr>
+          <a:xfrm>
+            <a:off x="2873838" y="5824993"/>
+            <a:ext cx="587661" cy="369332"/>
+          </a:xfrm>
+          <a:prstGeom prst="rect">
+            <a:avLst/>
+          </a:prstGeom>
+          <a:noFill/>
+        </p:spPr>
+        <p:txBody>
+          <a:bodyPr wrap="none" rtlCol="0">
+            <a:spAutoFit/>
+          </a:bodyPr>
+          <a:lstStyle/>
+          <a:p>
+            <a:r>
+              <a:rPr lang="en-US" dirty="0"/>
+              <a:t>wait</a:t>
+            </a:r>
+          </a:p>
+        </p:txBody>
+      </p:sp>
+      <p:sp>
+        <p:nvSpPr>
+          <p:cNvPr id="25" name="TextBox 24">
+            <a:extLst>
+              <a:ext uri="{FF2B5EF4-FFF2-40B4-BE49-F238E27FC236}">
+                <a16:creationId xmlns:a16="http://schemas.microsoft.com/office/drawing/2014/main" id="{427E81B6-5A87-3B50-A5B6-F5B67609861F}"/>
+              </a:ext>
+            </a:extLst>
+          </p:cNvPr>
+          <p:cNvSpPr txBox="1"/>
+          <p:nvPr/>
+        </p:nvSpPr>
+        <p:spPr>
+          <a:xfrm>
+            <a:off x="5509639" y="5298217"/>
+            <a:ext cx="587661" cy="369332"/>
+          </a:xfrm>
+          <a:prstGeom prst="rect">
+            <a:avLst/>
+          </a:prstGeom>
+          <a:noFill/>
+        </p:spPr>
+        <p:txBody>
+          <a:bodyPr wrap="none" rtlCol="0">
+            <a:spAutoFit/>
+          </a:bodyPr>
+          <a:lstStyle/>
+          <a:p>
+            <a:r>
+              <a:rPr lang="en-US" dirty="0"/>
+              <a:t>wait</a:t>
+            </a:r>
+          </a:p>
+        </p:txBody>
+      </p:sp>
+      <p:sp>
+        <p:nvSpPr>
+          <p:cNvPr id="26" name="TextBox 25">
+            <a:extLst>
+              <a:ext uri="{FF2B5EF4-FFF2-40B4-BE49-F238E27FC236}">
+                <a16:creationId xmlns:a16="http://schemas.microsoft.com/office/drawing/2014/main" id="{16998250-390F-69FE-0AF4-3C7A03E2AEBB}"/>
+              </a:ext>
+            </a:extLst>
+          </p:cNvPr>
+          <p:cNvSpPr txBox="1"/>
+          <p:nvPr/>
+        </p:nvSpPr>
+        <p:spPr>
+          <a:xfrm>
+            <a:off x="4619978" y="5298217"/>
+            <a:ext cx="413896" cy="369332"/>
+          </a:xfrm>
+          <a:prstGeom prst="rect">
+            <a:avLst/>
+          </a:prstGeom>
+          <a:noFill/>
+        </p:spPr>
+        <p:txBody>
+          <a:bodyPr wrap="none" rtlCol="0">
+            <a:spAutoFit/>
+          </a:bodyPr>
+          <a:lstStyle/>
+          <a:p>
+            <a:r>
+              <a:rPr lang="en-US" dirty="0"/>
+              <a:t>go</a:t>
+            </a:r>
+          </a:p>
+        </p:txBody>
+      </p:sp>
+      <p:sp>
+        <p:nvSpPr>
+          <p:cNvPr id="27" name="TextBox 26">
+            <a:extLst>
+              <a:ext uri="{FF2B5EF4-FFF2-40B4-BE49-F238E27FC236}">
+                <a16:creationId xmlns:a16="http://schemas.microsoft.com/office/drawing/2014/main" id="{C5755E01-D60B-53E8-B29C-BDE785E11C87}"/>
+              </a:ext>
+            </a:extLst>
+          </p:cNvPr>
+          <p:cNvSpPr txBox="1"/>
+          <p:nvPr/>
+        </p:nvSpPr>
+        <p:spPr>
+          <a:xfrm>
+            <a:off x="1961618" y="5824993"/>
+            <a:ext cx="413896" cy="369332"/>
+          </a:xfrm>
+          <a:prstGeom prst="rect">
+            <a:avLst/>
+          </a:prstGeom>
+          <a:noFill/>
+        </p:spPr>
+        <p:txBody>
+          <a:bodyPr wrap="none" rtlCol="0">
+            <a:spAutoFit/>
+          </a:bodyPr>
+          <a:lstStyle/>
+          <a:p>
+            <a:r>
+              <a:rPr lang="en-US" dirty="0"/>
+              <a:t>go</a:t>
+            </a:r>
+          </a:p>
+        </p:txBody>
+      </p:sp>
+      <p:sp>
+        <p:nvSpPr>
+          <p:cNvPr id="28" name="TextBox 27">
+            <a:extLst>
+              <a:ext uri="{FF2B5EF4-FFF2-40B4-BE49-F238E27FC236}">
+                <a16:creationId xmlns:a16="http://schemas.microsoft.com/office/drawing/2014/main" id="{757883C6-F349-4F37-8CFA-504EE494B09D}"/>
+              </a:ext>
+            </a:extLst>
+          </p:cNvPr>
+          <p:cNvSpPr txBox="1"/>
+          <p:nvPr/>
+        </p:nvSpPr>
+        <p:spPr>
+          <a:xfrm>
+            <a:off x="6377324" y="5299459"/>
+            <a:ext cx="413896" cy="369332"/>
+          </a:xfrm>
+          <a:prstGeom prst="rect">
+            <a:avLst/>
+          </a:prstGeom>
+          <a:noFill/>
+        </p:spPr>
+        <p:txBody>
+          <a:bodyPr wrap="none" rtlCol="0">
+            <a:spAutoFit/>
+          </a:bodyPr>
+          <a:lstStyle/>
+          <a:p>
+            <a:r>
+              <a:rPr lang="en-US" dirty="0"/>
+              <a:t>go</a:t>
+            </a:r>
+          </a:p>
+        </p:txBody>
+      </p:sp>
+      <p:sp>
+        <p:nvSpPr>
+          <p:cNvPr id="29" name="TextBox 28">
+            <a:extLst>
+              <a:ext uri="{FF2B5EF4-FFF2-40B4-BE49-F238E27FC236}">
+                <a16:creationId xmlns:a16="http://schemas.microsoft.com/office/drawing/2014/main" id="{E768FBA7-D474-9D60-4786-6F52AED696D5}"/>
+              </a:ext>
+            </a:extLst>
+          </p:cNvPr>
+          <p:cNvSpPr txBox="1"/>
+          <p:nvPr/>
+        </p:nvSpPr>
+        <p:spPr>
+          <a:xfrm>
+            <a:off x="3411414" y="5824993"/>
+            <a:ext cx="413896" cy="369332"/>
+          </a:xfrm>
+          <a:prstGeom prst="rect">
+            <a:avLst/>
+          </a:prstGeom>
+          <a:noFill/>
+        </p:spPr>
+        <p:txBody>
+          <a:bodyPr wrap="none" rtlCol="0">
+            <a:spAutoFit/>
+          </a:bodyPr>
+          <a:lstStyle/>
+          <a:p>
+            <a:r>
+              <a:rPr lang="en-US" dirty="0"/>
+              <a:t>go</a:t>
+            </a:r>
+          </a:p>
+        </p:txBody>
+      </p:sp>
+      <p:cxnSp>
+        <p:nvCxnSpPr>
+          <p:cNvPr id="31" name="Straight Arrow Connector 30">
+            <a:extLst>
+              <a:ext uri="{FF2B5EF4-FFF2-40B4-BE49-F238E27FC236}">
+                <a16:creationId xmlns:a16="http://schemas.microsoft.com/office/drawing/2014/main" id="{9B39A633-44F0-1DEA-749D-DA418F59EA82}"/>
+              </a:ext>
+            </a:extLst>
+          </p:cNvPr>
+          <p:cNvCxnSpPr>
+            <a:cxnSpLocks/>
+            <a:stCxn id="9" idx="2"/>
+            <a:endCxn id="11" idx="0"/>
+          </p:cNvCxnSpPr>
+          <p:nvPr/>
+        </p:nvCxnSpPr>
+        <p:spPr>
+          <a:xfrm flipH="1">
+            <a:off x="4338654" y="4138214"/>
+            <a:ext cx="1757346" cy="106451"/>
+          </a:xfrm>
+          <a:prstGeom prst="straightConnector1">
+            <a:avLst/>
+          </a:prstGeom>
+          <a:ln>
+            <a:tailEnd type="triangle"/>
+          </a:ln>
+        </p:spPr>
+        <p:style>
+          <a:lnRef idx="1">
+            <a:schemeClr val="accent1"/>
+          </a:lnRef>
+          <a:fillRef idx="0">
+            <a:schemeClr val="accent1"/>
+          </a:fillRef>
+          <a:effectRef idx="0">
+            <a:schemeClr val="accent1"/>
+          </a:effectRef>
+          <a:fontRef idx="minor">
+            <a:schemeClr val="tx1"/>
+          </a:fontRef>
+        </p:style>
+      </p:cxnSp>
+      <p:cxnSp>
+        <p:nvCxnSpPr>
+          <p:cNvPr id="33" name="Straight Arrow Connector 32">
+            <a:extLst>
+              <a:ext uri="{FF2B5EF4-FFF2-40B4-BE49-F238E27FC236}">
+                <a16:creationId xmlns:a16="http://schemas.microsoft.com/office/drawing/2014/main" id="{7C4466A3-88E0-656F-3B91-C04B9C28972A}"/>
+              </a:ext>
+            </a:extLst>
+          </p:cNvPr>
+          <p:cNvCxnSpPr>
+            <a:cxnSpLocks/>
+            <a:stCxn id="9" idx="2"/>
+            <a:endCxn id="10" idx="0"/>
+          </p:cNvCxnSpPr>
+          <p:nvPr/>
+        </p:nvCxnSpPr>
+        <p:spPr>
+          <a:xfrm>
+            <a:off x="6096000" y="4138214"/>
+            <a:ext cx="1953088" cy="106451"/>
+          </a:xfrm>
+          <a:prstGeom prst="straightConnector1">
+            <a:avLst/>
+          </a:prstGeom>
+          <a:ln>
+            <a:tailEnd type="triangle"/>
+          </a:ln>
+        </p:spPr>
+        <p:style>
+          <a:lnRef idx="1">
+            <a:schemeClr val="accent1"/>
+          </a:lnRef>
+          <a:fillRef idx="0">
+            <a:schemeClr val="accent1"/>
+          </a:fillRef>
+          <a:effectRef idx="0">
+            <a:schemeClr val="accent1"/>
+          </a:effectRef>
+          <a:fontRef idx="minor">
+            <a:schemeClr val="tx1"/>
+          </a:fontRef>
+        </p:style>
+      </p:cxnSp>
+      <p:cxnSp>
+        <p:nvCxnSpPr>
+          <p:cNvPr id="35" name="Straight Arrow Connector 34">
+            <a:extLst>
+              <a:ext uri="{FF2B5EF4-FFF2-40B4-BE49-F238E27FC236}">
+                <a16:creationId xmlns:a16="http://schemas.microsoft.com/office/drawing/2014/main" id="{E48BFB04-06A3-C358-9107-6303278C3B22}"/>
+              </a:ext>
+            </a:extLst>
+          </p:cNvPr>
+          <p:cNvCxnSpPr>
+            <a:cxnSpLocks/>
+            <a:stCxn id="11" idx="2"/>
+            <a:endCxn id="16" idx="0"/>
+          </p:cNvCxnSpPr>
+          <p:nvPr/>
+        </p:nvCxnSpPr>
+        <p:spPr>
+          <a:xfrm flipH="1">
+            <a:off x="3362110" y="4613997"/>
+            <a:ext cx="976544" cy="157444"/>
+          </a:xfrm>
+          <a:prstGeom prst="straightConnector1">
+            <a:avLst/>
+          </a:prstGeom>
+          <a:ln>
+            <a:tailEnd type="triangle"/>
+          </a:ln>
+        </p:spPr>
+        <p:style>
+          <a:lnRef idx="1">
+            <a:schemeClr val="accent1"/>
+          </a:lnRef>
+          <a:fillRef idx="0">
+            <a:schemeClr val="accent1"/>
+          </a:fillRef>
+          <a:effectRef idx="0">
+            <a:schemeClr val="accent1"/>
+          </a:effectRef>
+          <a:fontRef idx="minor">
+            <a:schemeClr val="tx1"/>
+          </a:fontRef>
+        </p:style>
+      </p:cxnSp>
+      <p:cxnSp>
+        <p:nvCxnSpPr>
+          <p:cNvPr id="37" name="Straight Arrow Connector 36">
+            <a:extLst>
+              <a:ext uri="{FF2B5EF4-FFF2-40B4-BE49-F238E27FC236}">
+                <a16:creationId xmlns:a16="http://schemas.microsoft.com/office/drawing/2014/main" id="{FADE2067-72B2-9B7C-A98C-8D551559214C}"/>
+              </a:ext>
+            </a:extLst>
+          </p:cNvPr>
+          <p:cNvCxnSpPr>
+            <a:cxnSpLocks/>
+            <a:stCxn id="11" idx="2"/>
+            <a:endCxn id="15" idx="0"/>
+          </p:cNvCxnSpPr>
+          <p:nvPr/>
+        </p:nvCxnSpPr>
+        <p:spPr>
+          <a:xfrm>
+            <a:off x="4338654" y="4613997"/>
+            <a:ext cx="976544" cy="157444"/>
+          </a:xfrm>
+          <a:prstGeom prst="straightConnector1">
+            <a:avLst/>
+          </a:prstGeom>
+          <a:ln>
+            <a:tailEnd type="triangle"/>
+          </a:ln>
+        </p:spPr>
+        <p:style>
+          <a:lnRef idx="1">
+            <a:schemeClr val="accent1"/>
+          </a:lnRef>
+          <a:fillRef idx="0">
+            <a:schemeClr val="accent1"/>
+          </a:fillRef>
+          <a:effectRef idx="0">
+            <a:schemeClr val="accent1"/>
+          </a:effectRef>
+          <a:fontRef idx="minor">
+            <a:schemeClr val="tx1"/>
+          </a:fontRef>
+        </p:style>
+      </p:cxnSp>
+      <p:cxnSp>
+        <p:nvCxnSpPr>
+          <p:cNvPr id="39" name="Straight Arrow Connector 38">
+            <a:extLst>
+              <a:ext uri="{FF2B5EF4-FFF2-40B4-BE49-F238E27FC236}">
+                <a16:creationId xmlns:a16="http://schemas.microsoft.com/office/drawing/2014/main" id="{AE2CBDCB-F5FF-59E3-663C-84AD16708DC6}"/>
+              </a:ext>
+            </a:extLst>
+          </p:cNvPr>
+          <p:cNvCxnSpPr>
+            <a:stCxn id="15" idx="2"/>
+            <a:endCxn id="25" idx="0"/>
+          </p:cNvCxnSpPr>
+          <p:nvPr/>
+        </p:nvCxnSpPr>
+        <p:spPr>
+          <a:xfrm>
+            <a:off x="5315198" y="5140773"/>
+            <a:ext cx="488272" cy="157444"/>
+          </a:xfrm>
+          <a:prstGeom prst="straightConnector1">
+            <a:avLst/>
+          </a:prstGeom>
+          <a:ln>
+            <a:tailEnd type="triangle"/>
+          </a:ln>
+        </p:spPr>
+        <p:style>
+          <a:lnRef idx="1">
+            <a:schemeClr val="accent1"/>
+          </a:lnRef>
+          <a:fillRef idx="0">
+            <a:schemeClr val="accent1"/>
+          </a:fillRef>
+          <a:effectRef idx="0">
+            <a:schemeClr val="accent1"/>
+          </a:effectRef>
+          <a:fontRef idx="minor">
+            <a:schemeClr val="tx1"/>
+          </a:fontRef>
+        </p:style>
+      </p:cxnSp>
+      <p:cxnSp>
+        <p:nvCxnSpPr>
+          <p:cNvPr id="41" name="Straight Arrow Connector 40">
+            <a:extLst>
+              <a:ext uri="{FF2B5EF4-FFF2-40B4-BE49-F238E27FC236}">
+                <a16:creationId xmlns:a16="http://schemas.microsoft.com/office/drawing/2014/main" id="{8E0B1BD9-F292-EE5F-2032-66DD26AED1AC}"/>
+              </a:ext>
+            </a:extLst>
+          </p:cNvPr>
+          <p:cNvCxnSpPr>
+            <a:stCxn id="15" idx="2"/>
+            <a:endCxn id="26" idx="0"/>
+          </p:cNvCxnSpPr>
+          <p:nvPr/>
+        </p:nvCxnSpPr>
+        <p:spPr>
+          <a:xfrm flipH="1">
+            <a:off x="4826926" y="5140773"/>
+            <a:ext cx="488272" cy="157444"/>
+          </a:xfrm>
+          <a:prstGeom prst="straightConnector1">
+            <a:avLst/>
+          </a:prstGeom>
+          <a:ln>
+            <a:tailEnd type="triangle"/>
+          </a:ln>
+        </p:spPr>
+        <p:style>
+          <a:lnRef idx="1">
+            <a:schemeClr val="accent1"/>
+          </a:lnRef>
+          <a:fillRef idx="0">
+            <a:schemeClr val="accent1"/>
+          </a:fillRef>
+          <a:effectRef idx="0">
+            <a:schemeClr val="accent1"/>
+          </a:effectRef>
+          <a:fontRef idx="minor">
+            <a:schemeClr val="tx1"/>
+          </a:fontRef>
+        </p:style>
+      </p:cxnSp>
+      <p:cxnSp>
+        <p:nvCxnSpPr>
+          <p:cNvPr id="47" name="Straight Arrow Connector 46">
+            <a:extLst>
+              <a:ext uri="{FF2B5EF4-FFF2-40B4-BE49-F238E27FC236}">
+                <a16:creationId xmlns:a16="http://schemas.microsoft.com/office/drawing/2014/main" id="{BA86C07A-82D7-4BF6-6EE0-9068DEA03C9F}"/>
+              </a:ext>
+            </a:extLst>
+          </p:cNvPr>
+          <p:cNvCxnSpPr>
+            <a:stCxn id="16" idx="2"/>
+            <a:endCxn id="18" idx="0"/>
+          </p:cNvCxnSpPr>
+          <p:nvPr/>
+        </p:nvCxnSpPr>
+        <p:spPr>
+          <a:xfrm flipH="1">
+            <a:off x="2656838" y="5140773"/>
+            <a:ext cx="705272" cy="157444"/>
+          </a:xfrm>
+          <a:prstGeom prst="straightConnector1">
+            <a:avLst/>
+          </a:prstGeom>
+          <a:ln>
+            <a:tailEnd type="triangle"/>
+          </a:ln>
+        </p:spPr>
+        <p:style>
+          <a:lnRef idx="1">
+            <a:schemeClr val="accent1"/>
+          </a:lnRef>
+          <a:fillRef idx="0">
+            <a:schemeClr val="accent1"/>
+          </a:fillRef>
+          <a:effectRef idx="0">
+            <a:schemeClr val="accent1"/>
+          </a:effectRef>
+          <a:fontRef idx="minor">
+            <a:schemeClr val="tx1"/>
+          </a:fontRef>
+        </p:style>
+      </p:cxnSp>
+      <p:cxnSp>
+        <p:nvCxnSpPr>
+          <p:cNvPr id="49" name="Straight Arrow Connector 48">
+            <a:extLst>
+              <a:ext uri="{FF2B5EF4-FFF2-40B4-BE49-F238E27FC236}">
+                <a16:creationId xmlns:a16="http://schemas.microsoft.com/office/drawing/2014/main" id="{C31544F0-D685-E314-CD2C-A737EDCF422C}"/>
+              </a:ext>
+            </a:extLst>
+          </p:cNvPr>
+          <p:cNvCxnSpPr>
+            <a:stCxn id="16" idx="2"/>
+            <a:endCxn id="17" idx="0"/>
+          </p:cNvCxnSpPr>
+          <p:nvPr/>
+        </p:nvCxnSpPr>
+        <p:spPr>
+          <a:xfrm>
+            <a:off x="3362110" y="5140773"/>
+            <a:ext cx="744524" cy="157444"/>
+          </a:xfrm>
+          <a:prstGeom prst="straightConnector1">
+            <a:avLst/>
+          </a:prstGeom>
+          <a:ln>
+            <a:tailEnd type="triangle"/>
+          </a:ln>
+        </p:spPr>
+        <p:style>
+          <a:lnRef idx="1">
+            <a:schemeClr val="accent1"/>
+          </a:lnRef>
+          <a:fillRef idx="0">
+            <a:schemeClr val="accent1"/>
+          </a:fillRef>
+          <a:effectRef idx="0">
+            <a:schemeClr val="accent1"/>
+          </a:effectRef>
+          <a:fontRef idx="minor">
+            <a:schemeClr val="tx1"/>
+          </a:fontRef>
+        </p:style>
+      </p:cxnSp>
+      <p:cxnSp>
+        <p:nvCxnSpPr>
+          <p:cNvPr id="51" name="Straight Arrow Connector 50">
+            <a:extLst>
+              <a:ext uri="{FF2B5EF4-FFF2-40B4-BE49-F238E27FC236}">
+                <a16:creationId xmlns:a16="http://schemas.microsoft.com/office/drawing/2014/main" id="{D96A2B3A-0FA6-1147-C457-07823CE6E5E9}"/>
+              </a:ext>
+            </a:extLst>
+          </p:cNvPr>
+          <p:cNvCxnSpPr>
+            <a:stCxn id="18" idx="2"/>
+            <a:endCxn id="27" idx="0"/>
+          </p:cNvCxnSpPr>
+          <p:nvPr/>
+        </p:nvCxnSpPr>
+        <p:spPr>
+          <a:xfrm flipH="1">
+            <a:off x="2168566" y="5667549"/>
+            <a:ext cx="488272" cy="157444"/>
+          </a:xfrm>
+          <a:prstGeom prst="straightConnector1">
+            <a:avLst/>
+          </a:prstGeom>
+          <a:ln>
+            <a:tailEnd type="triangle"/>
+          </a:ln>
+        </p:spPr>
+        <p:style>
+          <a:lnRef idx="1">
+            <a:schemeClr val="accent1"/>
+          </a:lnRef>
+          <a:fillRef idx="0">
+            <a:schemeClr val="accent1"/>
+          </a:fillRef>
+          <a:effectRef idx="0">
+            <a:schemeClr val="accent1"/>
+          </a:effectRef>
+          <a:fontRef idx="minor">
+            <a:schemeClr val="tx1"/>
+          </a:fontRef>
+        </p:style>
+      </p:cxnSp>
+      <p:cxnSp>
+        <p:nvCxnSpPr>
+          <p:cNvPr id="53" name="Straight Arrow Connector 52">
+            <a:extLst>
+              <a:ext uri="{FF2B5EF4-FFF2-40B4-BE49-F238E27FC236}">
+                <a16:creationId xmlns:a16="http://schemas.microsoft.com/office/drawing/2014/main" id="{65AAF924-6E86-28E8-560C-15C1F8B8F3BC}"/>
+              </a:ext>
+            </a:extLst>
+          </p:cNvPr>
+          <p:cNvCxnSpPr>
+            <a:stCxn id="18" idx="2"/>
+            <a:endCxn id="24" idx="0"/>
+          </p:cNvCxnSpPr>
+          <p:nvPr/>
+        </p:nvCxnSpPr>
+        <p:spPr>
+          <a:xfrm>
+            <a:off x="2656838" y="5667549"/>
+            <a:ext cx="510831" cy="157444"/>
+          </a:xfrm>
+          <a:prstGeom prst="straightConnector1">
+            <a:avLst/>
+          </a:prstGeom>
+          <a:ln>
+            <a:tailEnd type="triangle"/>
+          </a:ln>
+        </p:spPr>
+        <p:style>
+          <a:lnRef idx="1">
+            <a:schemeClr val="accent1"/>
+          </a:lnRef>
+          <a:fillRef idx="0">
+            <a:schemeClr val="accent1"/>
+          </a:fillRef>
+          <a:effectRef idx="0">
+            <a:schemeClr val="accent1"/>
+          </a:effectRef>
+          <a:fontRef idx="minor">
+            <a:schemeClr val="tx1"/>
+          </a:fontRef>
+        </p:style>
+      </p:cxnSp>
+      <p:cxnSp>
+        <p:nvCxnSpPr>
+          <p:cNvPr id="55" name="Straight Arrow Connector 54">
+            <a:extLst>
+              <a:ext uri="{FF2B5EF4-FFF2-40B4-BE49-F238E27FC236}">
+                <a16:creationId xmlns:a16="http://schemas.microsoft.com/office/drawing/2014/main" id="{709C5B80-E54A-09A4-7A06-29FD69AEEF78}"/>
+              </a:ext>
+            </a:extLst>
+          </p:cNvPr>
+          <p:cNvCxnSpPr>
+            <a:stCxn id="17" idx="2"/>
+            <a:endCxn id="29" idx="0"/>
+          </p:cNvCxnSpPr>
+          <p:nvPr/>
+        </p:nvCxnSpPr>
+        <p:spPr>
+          <a:xfrm flipH="1">
+            <a:off x="3618362" y="5667549"/>
+            <a:ext cx="488272" cy="157444"/>
+          </a:xfrm>
+          <a:prstGeom prst="straightConnector1">
+            <a:avLst/>
+          </a:prstGeom>
+          <a:ln>
+            <a:tailEnd type="triangle"/>
+          </a:ln>
+        </p:spPr>
+        <p:style>
+          <a:lnRef idx="1">
+            <a:schemeClr val="accent1"/>
+          </a:lnRef>
+          <a:fillRef idx="0">
+            <a:schemeClr val="accent1"/>
+          </a:fillRef>
+          <a:effectRef idx="0">
+            <a:schemeClr val="accent1"/>
+          </a:effectRef>
+          <a:fontRef idx="minor">
+            <a:schemeClr val="tx1"/>
+          </a:fontRef>
+        </p:style>
+      </p:cxnSp>
+      <p:cxnSp>
+        <p:nvCxnSpPr>
+          <p:cNvPr id="57" name="Straight Arrow Connector 56">
+            <a:extLst>
+              <a:ext uri="{FF2B5EF4-FFF2-40B4-BE49-F238E27FC236}">
+                <a16:creationId xmlns:a16="http://schemas.microsoft.com/office/drawing/2014/main" id="{40C28A78-C47E-7040-E4FB-F149CD3D54FB}"/>
+              </a:ext>
+            </a:extLst>
+          </p:cNvPr>
+          <p:cNvCxnSpPr>
+            <a:stCxn id="17" idx="2"/>
+            <a:endCxn id="23" idx="0"/>
+          </p:cNvCxnSpPr>
+          <p:nvPr/>
+        </p:nvCxnSpPr>
+        <p:spPr>
+          <a:xfrm>
+            <a:off x="4106634" y="5667549"/>
+            <a:ext cx="426462" cy="157444"/>
+          </a:xfrm>
+          <a:prstGeom prst="straightConnector1">
+            <a:avLst/>
+          </a:prstGeom>
+          <a:ln>
+            <a:tailEnd type="triangle"/>
+          </a:ln>
+        </p:spPr>
+        <p:style>
+          <a:lnRef idx="1">
+            <a:schemeClr val="accent1"/>
+          </a:lnRef>
+          <a:fillRef idx="0">
+            <a:schemeClr val="accent1"/>
+          </a:fillRef>
+          <a:effectRef idx="0">
+            <a:schemeClr val="accent1"/>
+          </a:effectRef>
+          <a:fontRef idx="minor">
+            <a:schemeClr val="tx1"/>
+          </a:fontRef>
+        </p:style>
+      </p:cxnSp>
+      <p:cxnSp>
+        <p:nvCxnSpPr>
+          <p:cNvPr id="59" name="Straight Arrow Connector 58">
+            <a:extLst>
+              <a:ext uri="{FF2B5EF4-FFF2-40B4-BE49-F238E27FC236}">
+                <a16:creationId xmlns:a16="http://schemas.microsoft.com/office/drawing/2014/main" id="{0420EB38-9795-A55D-D4DC-3D3F951D7851}"/>
+              </a:ext>
+            </a:extLst>
+          </p:cNvPr>
+          <p:cNvCxnSpPr>
+            <a:stCxn id="10" idx="2"/>
+            <a:endCxn id="13" idx="0"/>
+          </p:cNvCxnSpPr>
+          <p:nvPr/>
+        </p:nvCxnSpPr>
+        <p:spPr>
+          <a:xfrm flipH="1">
+            <a:off x="7072544" y="4613997"/>
+            <a:ext cx="976544" cy="157444"/>
+          </a:xfrm>
+          <a:prstGeom prst="straightConnector1">
+            <a:avLst/>
+          </a:prstGeom>
+          <a:ln>
+            <a:tailEnd type="triangle"/>
+          </a:ln>
+        </p:spPr>
+        <p:style>
+          <a:lnRef idx="1">
+            <a:schemeClr val="accent1"/>
+          </a:lnRef>
+          <a:fillRef idx="0">
+            <a:schemeClr val="accent1"/>
+          </a:fillRef>
+          <a:effectRef idx="0">
+            <a:schemeClr val="accent1"/>
+          </a:effectRef>
+          <a:fontRef idx="minor">
+            <a:schemeClr val="tx1"/>
+          </a:fontRef>
+        </p:style>
+      </p:cxnSp>
+      <p:cxnSp>
+        <p:nvCxnSpPr>
+          <p:cNvPr id="61" name="Straight Arrow Connector 60">
+            <a:extLst>
+              <a:ext uri="{FF2B5EF4-FFF2-40B4-BE49-F238E27FC236}">
+                <a16:creationId xmlns:a16="http://schemas.microsoft.com/office/drawing/2014/main" id="{29794150-5FAC-6086-885B-48830AD95EA0}"/>
+              </a:ext>
+            </a:extLst>
+          </p:cNvPr>
+          <p:cNvCxnSpPr>
+            <a:stCxn id="10" idx="2"/>
+            <a:endCxn id="12" idx="0"/>
+          </p:cNvCxnSpPr>
+          <p:nvPr/>
+        </p:nvCxnSpPr>
+        <p:spPr>
+          <a:xfrm>
+            <a:off x="8049088" y="4613997"/>
+            <a:ext cx="976544" cy="157444"/>
+          </a:xfrm>
+          <a:prstGeom prst="straightConnector1">
+            <a:avLst/>
+          </a:prstGeom>
+          <a:ln>
+            <a:tailEnd type="triangle"/>
+          </a:ln>
+        </p:spPr>
+        <p:style>
+          <a:lnRef idx="1">
+            <a:schemeClr val="accent1"/>
+          </a:lnRef>
+          <a:fillRef idx="0">
+            <a:schemeClr val="accent1"/>
+          </a:fillRef>
+          <a:effectRef idx="0">
+            <a:schemeClr val="accent1"/>
+          </a:effectRef>
+          <a:fontRef idx="minor">
+            <a:schemeClr val="tx1"/>
+          </a:fontRef>
+        </p:style>
+      </p:cxnSp>
+      <p:cxnSp>
+        <p:nvCxnSpPr>
+          <p:cNvPr id="63" name="Straight Arrow Connector 62">
+            <a:extLst>
+              <a:ext uri="{FF2B5EF4-FFF2-40B4-BE49-F238E27FC236}">
+                <a16:creationId xmlns:a16="http://schemas.microsoft.com/office/drawing/2014/main" id="{7DBE1177-1A87-BC1F-20F3-EB5F23421097}"/>
+              </a:ext>
+            </a:extLst>
+          </p:cNvPr>
+          <p:cNvCxnSpPr>
+            <a:stCxn id="13" idx="2"/>
+            <a:endCxn id="28" idx="0"/>
+          </p:cNvCxnSpPr>
+          <p:nvPr/>
+        </p:nvCxnSpPr>
+        <p:spPr>
+          <a:xfrm flipH="1">
+            <a:off x="6584272" y="5140773"/>
+            <a:ext cx="488272" cy="158686"/>
+          </a:xfrm>
+          <a:prstGeom prst="straightConnector1">
+            <a:avLst/>
+          </a:prstGeom>
+          <a:ln>
+            <a:tailEnd type="triangle"/>
+          </a:ln>
+        </p:spPr>
+        <p:style>
+          <a:lnRef idx="1">
+            <a:schemeClr val="accent1"/>
+          </a:lnRef>
+          <a:fillRef idx="0">
+            <a:schemeClr val="accent1"/>
+          </a:fillRef>
+          <a:effectRef idx="0">
+            <a:schemeClr val="accent1"/>
+          </a:effectRef>
+          <a:fontRef idx="minor">
+            <a:schemeClr val="tx1"/>
+          </a:fontRef>
+        </p:style>
+      </p:cxnSp>
+      <p:cxnSp>
+        <p:nvCxnSpPr>
+          <p:cNvPr id="65" name="Straight Arrow Connector 64">
+            <a:extLst>
+              <a:ext uri="{FF2B5EF4-FFF2-40B4-BE49-F238E27FC236}">
+                <a16:creationId xmlns:a16="http://schemas.microsoft.com/office/drawing/2014/main" id="{DC45E57C-8554-6E20-3EDF-69A2B253B421}"/>
+              </a:ext>
+            </a:extLst>
+          </p:cNvPr>
+          <p:cNvCxnSpPr>
+            <a:stCxn id="13" idx="2"/>
+            <a:endCxn id="22" idx="0"/>
+          </p:cNvCxnSpPr>
+          <p:nvPr/>
+        </p:nvCxnSpPr>
+        <p:spPr>
+          <a:xfrm>
+            <a:off x="7072544" y="5140773"/>
+            <a:ext cx="488272" cy="157444"/>
+          </a:xfrm>
+          <a:prstGeom prst="straightConnector1">
+            <a:avLst/>
+          </a:prstGeom>
+          <a:ln>
+            <a:tailEnd type="triangle"/>
+          </a:ln>
+        </p:spPr>
+        <p:style>
+          <a:lnRef idx="1">
+            <a:schemeClr val="accent1"/>
+          </a:lnRef>
+          <a:fillRef idx="0">
+            <a:schemeClr val="accent1"/>
+          </a:fillRef>
+          <a:effectRef idx="0">
+            <a:schemeClr val="accent1"/>
+          </a:effectRef>
+          <a:fontRef idx="minor">
+            <a:schemeClr val="tx1"/>
+          </a:fontRef>
+        </p:style>
+      </p:cxnSp>
+      <p:cxnSp>
+        <p:nvCxnSpPr>
+          <p:cNvPr id="67" name="Straight Arrow Connector 66">
+            <a:extLst>
+              <a:ext uri="{FF2B5EF4-FFF2-40B4-BE49-F238E27FC236}">
+                <a16:creationId xmlns:a16="http://schemas.microsoft.com/office/drawing/2014/main" id="{6D602385-2202-D51B-E11E-DE9ADFFF7234}"/>
+              </a:ext>
+            </a:extLst>
+          </p:cNvPr>
+          <p:cNvCxnSpPr>
+            <a:stCxn id="12" idx="2"/>
+            <a:endCxn id="19" idx="0"/>
+          </p:cNvCxnSpPr>
+          <p:nvPr/>
+        </p:nvCxnSpPr>
+        <p:spPr>
+          <a:xfrm flipH="1">
+            <a:off x="8537359" y="5140773"/>
+            <a:ext cx="488273" cy="157444"/>
+          </a:xfrm>
+          <a:prstGeom prst="straightConnector1">
+            <a:avLst/>
+          </a:prstGeom>
+          <a:ln>
+            <a:tailEnd type="triangle"/>
+          </a:ln>
+        </p:spPr>
+        <p:style>
+          <a:lnRef idx="1">
+            <a:schemeClr val="accent1"/>
+          </a:lnRef>
+          <a:fillRef idx="0">
+            <a:schemeClr val="accent1"/>
+          </a:fillRef>
+          <a:effectRef idx="0">
+            <a:schemeClr val="accent1"/>
+          </a:effectRef>
+          <a:fontRef idx="minor">
+            <a:schemeClr val="tx1"/>
+          </a:fontRef>
+        </p:style>
+      </p:cxnSp>
+      <p:cxnSp>
+        <p:nvCxnSpPr>
+          <p:cNvPr id="69" name="Straight Arrow Connector 68">
+            <a:extLst>
+              <a:ext uri="{FF2B5EF4-FFF2-40B4-BE49-F238E27FC236}">
+                <a16:creationId xmlns:a16="http://schemas.microsoft.com/office/drawing/2014/main" id="{941C3518-C61A-F682-B59C-0324D85B12DC}"/>
+              </a:ext>
+            </a:extLst>
+          </p:cNvPr>
+          <p:cNvCxnSpPr>
+            <a:stCxn id="12" idx="2"/>
+            <a:endCxn id="20" idx="0"/>
+          </p:cNvCxnSpPr>
+          <p:nvPr/>
+        </p:nvCxnSpPr>
+        <p:spPr>
+          <a:xfrm>
+            <a:off x="9025632" y="5140773"/>
+            <a:ext cx="488272" cy="157444"/>
+          </a:xfrm>
+          <a:prstGeom prst="straightConnector1">
+            <a:avLst/>
+          </a:prstGeom>
+          <a:ln>
+            <a:tailEnd type="triangle"/>
+          </a:ln>
+        </p:spPr>
+        <p:style>
+          <a:lnRef idx="1">
+            <a:schemeClr val="accent1"/>
+          </a:lnRef>
+          <a:fillRef idx="0">
+            <a:schemeClr val="accent1"/>
+          </a:fillRef>
+          <a:effectRef idx="0">
+            <a:schemeClr val="accent1"/>
+          </a:effectRef>
+          <a:fontRef idx="minor">
+            <a:schemeClr val="tx1"/>
+          </a:fontRef>
+        </p:style>
+      </p:cxnSp>
     </p:spTree>
     <p:extLst>
       <p:ext uri="{BB962C8B-B14F-4D97-AF65-F5344CB8AC3E}">
-        <p14:creationId xmlns:p14="http://schemas.microsoft.com/office/powerpoint/2010/main" val="602066058"/>
+        <p14:creationId xmlns:p14="http://schemas.microsoft.com/office/powerpoint/2010/main" val="546736307"/>
       </p:ext>
     </p:extLst>
   </p:cSld>
@@ -5512,7 +7470,7 @@
           <p:cNvPr id="2" name="Title 1">
             <a:extLst>
               <a:ext uri="{FF2B5EF4-FFF2-40B4-BE49-F238E27FC236}">
-                <a16:creationId xmlns:a16="http://schemas.microsoft.com/office/drawing/2014/main" id="{63C1546D-A12B-D4A4-B7C0-631734AE7CEF}"/>
+                <a16:creationId xmlns:a16="http://schemas.microsoft.com/office/drawing/2014/main" id="{2C6B1A2F-8098-2A67-A838-22EED4D2C903}"/>
               </a:ext>
             </a:extLst>
           </p:cNvPr>
@@ -5530,7 +7488,7 @@
           <a:p>
             <a:r>
               <a:rPr lang="en-US" dirty="0"/>
-              <a:t>Analysis</a:t>
+              <a:t>Simulation</a:t>
             </a:r>
           </a:p>
         </p:txBody>
@@ -5540,7 +7498,7 @@
           <p:cNvPr id="3" name="Content Placeholder 2">
             <a:extLst>
               <a:ext uri="{FF2B5EF4-FFF2-40B4-BE49-F238E27FC236}">
-                <a16:creationId xmlns:a16="http://schemas.microsoft.com/office/drawing/2014/main" id="{39C748A9-88EB-414A-C1DB-CF0598EBC387}"/>
+                <a16:creationId xmlns:a16="http://schemas.microsoft.com/office/drawing/2014/main" id="{13942F4E-0FC6-BB89-A203-DD5CF97DD95F}"/>
               </a:ext>
             </a:extLst>
           </p:cNvPr>
@@ -5556,49 +7514,77 @@
           <a:bodyPr/>
           <a:lstStyle/>
           <a:p>
-            <a:r>
-              <a:rPr lang="en-US" dirty="0"/>
-              <a:t>Unfortunately, the simulation is flawed, and currently the effects of pedestrians are either: nonexistent for sufficiently small numbers of pedestrians, or infinite for sufficiently large numbers</a:t>
-            </a:r>
-          </a:p>
-          <a:p>
-            <a:r>
-              <a:rPr lang="en-US" dirty="0"/>
-              <a:t>We will use a linear regression model to create a line between the number of pedestrians and the traffic flow, both entering and exiting the roundabout</a:t>
+            <a:pPr marL="514350" indent="-514350">
+              <a:buFont typeface="+mj-lt"/>
+              <a:buAutoNum type="arabicPeriod"/>
+            </a:pPr>
+            <a:r>
+              <a:rPr lang="en-US" dirty="0"/>
+              <a:t>Generate a list of cars and pedestrians</a:t>
+            </a:r>
+          </a:p>
+          <a:p>
+            <a:pPr marL="914400" lvl="1" indent="-457200">
+              <a:buFont typeface="+mj-lt"/>
+              <a:buAutoNum type="arabicPeriod"/>
+            </a:pPr>
+            <a:r>
+              <a:rPr lang="en-US" dirty="0"/>
+              <a:t>This will always generate the same 150 cars, where a car starts with a location and destination</a:t>
+            </a:r>
+          </a:p>
+          <a:p>
+            <a:pPr marL="514350" indent="-514350">
+              <a:buFont typeface="+mj-lt"/>
+              <a:buAutoNum type="arabicPeriod"/>
+            </a:pPr>
+            <a:r>
+              <a:rPr lang="en-US" dirty="0"/>
+              <a:t>Until all the cars have made it through the roundabout:</a:t>
+            </a:r>
+          </a:p>
+          <a:p>
+            <a:pPr marL="914400" lvl="1" indent="-457200">
+              <a:buFont typeface="+mj-lt"/>
+              <a:buAutoNum type="arabicPeriod"/>
+            </a:pPr>
+            <a:r>
+              <a:rPr lang="en-US" dirty="0"/>
+              <a:t>Evaluate the decision of each pedestrian first</a:t>
+            </a:r>
+          </a:p>
+          <a:p>
+            <a:pPr marL="914400" lvl="1" indent="-457200">
+              <a:buFont typeface="+mj-lt"/>
+              <a:buAutoNum type="arabicPeriod"/>
+            </a:pPr>
+            <a:r>
+              <a:rPr lang="en-US" dirty="0"/>
+              <a:t>Evaluate the decision of cars waiting to exit the system</a:t>
+            </a:r>
+          </a:p>
+          <a:p>
+            <a:pPr marL="914400" lvl="1" indent="-457200">
+              <a:buFont typeface="+mj-lt"/>
+              <a:buAutoNum type="arabicPeriod"/>
+            </a:pPr>
+            <a:r>
+              <a:rPr lang="en-US" dirty="0"/>
+              <a:t>Evaluate the decision of cars within the traffic circle</a:t>
+            </a:r>
+          </a:p>
+          <a:p>
+            <a:pPr marL="914400" lvl="1" indent="-457200">
+              <a:buFont typeface="+mj-lt"/>
+              <a:buAutoNum type="arabicPeriod"/>
+            </a:pPr>
+            <a:r>
+              <a:rPr lang="en-US" dirty="0"/>
+              <a:t>Evaluate the decision of cars that have yet to enter the circle</a:t>
             </a:r>
           </a:p>
           <a:p>
             <a:pPr lvl="1"/>
-            <a:r>
-              <a:rPr lang="en-US" dirty="0"/>
-              <a:t>The x-axis will be representative of the number of pedestrians</a:t>
-            </a:r>
-          </a:p>
-          <a:p>
-            <a:pPr lvl="2"/>
-            <a:r>
-              <a:rPr lang="en-US" dirty="0"/>
-              <a:t>x=0 corresponds to no pedestrians</a:t>
-            </a:r>
-          </a:p>
-          <a:p>
-            <a:pPr lvl="1"/>
-            <a:r>
-              <a:rPr lang="en-US" dirty="0"/>
-              <a:t>The y-axis will be representative of the average traffic flow across all 4 directions</a:t>
-            </a:r>
-          </a:p>
-          <a:p>
-            <a:pPr lvl="2"/>
-            <a:r>
-              <a:rPr lang="en-US" dirty="0"/>
-              <a:t>We will have 2 graphs, one for entering traffic and one for exiting traffic</a:t>
-            </a:r>
-          </a:p>
-          <a:p>
-            <a:pPr marL="457200" lvl="1" indent="0">
-              <a:buNone/>
-            </a:pPr>
             <a:endParaRPr lang="en-US" dirty="0"/>
           </a:p>
         </p:txBody>
@@ -5606,7 +7592,7 @@
     </p:spTree>
     <p:extLst>
       <p:ext uri="{BB962C8B-B14F-4D97-AF65-F5344CB8AC3E}">
-        <p14:creationId xmlns:p14="http://schemas.microsoft.com/office/powerpoint/2010/main" val="3410322686"/>
+        <p14:creationId xmlns:p14="http://schemas.microsoft.com/office/powerpoint/2010/main" val="602066058"/>
       </p:ext>
     </p:extLst>
   </p:cSld>

</xml_diff>